<commit_message>
added more dashboard layouts for the lols
</commit_message>
<xml_diff>
--- a/Dashboard Layouts.pptx
+++ b/Dashboard Layouts.pptx
@@ -6,6 +6,15 @@
   </p:sldMasterIdLst>
   <p:sldIdLst>
     <p:sldId id="256" r:id="rId2"/>
+    <p:sldId id="257" r:id="rId3"/>
+    <p:sldId id="258" r:id="rId4"/>
+    <p:sldId id="259" r:id="rId5"/>
+    <p:sldId id="260" r:id="rId6"/>
+    <p:sldId id="261" r:id="rId7"/>
+    <p:sldId id="262" r:id="rId8"/>
+    <p:sldId id="264" r:id="rId9"/>
+    <p:sldId id="263" r:id="rId10"/>
+    <p:sldId id="265" r:id="rId11"/>
   </p:sldIdLst>
   <p:sldSz cx="12192000" cy="6858000"/>
   <p:notesSz cx="6858000" cy="9144000"/>
@@ -104,6 +113,11 @@
       </a:defRPr>
     </a:lvl9pPr>
   </p:defaultTextStyle>
+  <p:extLst>
+    <p:ext uri="{EFAFB233-063F-42B5-8137-9DF3F51BA10A}">
+      <p15:sldGuideLst xmlns:p15="http://schemas.microsoft.com/office/powerpoint/2012/main"/>
+    </p:ext>
+  </p:extLst>
 </p:presentation>
 </file>
 
@@ -256,7 +270,7 @@
           <a:p>
             <a:fld id="{11C67344-9475-469F-A7B3-18CCED384F34}" type="datetimeFigureOut">
               <a:rPr lang="en-AU" smtClean="0"/>
-              <a:t>19/12/2023</a:t>
+              <a:t>20/12/2023</a:t>
             </a:fld>
             <a:endParaRPr lang="en-AU"/>
           </a:p>
@@ -456,7 +470,7 @@
           <a:p>
             <a:fld id="{11C67344-9475-469F-A7B3-18CCED384F34}" type="datetimeFigureOut">
               <a:rPr lang="en-AU" smtClean="0"/>
-              <a:t>19/12/2023</a:t>
+              <a:t>20/12/2023</a:t>
             </a:fld>
             <a:endParaRPr lang="en-AU"/>
           </a:p>
@@ -666,7 +680,7 @@
           <a:p>
             <a:fld id="{11C67344-9475-469F-A7B3-18CCED384F34}" type="datetimeFigureOut">
               <a:rPr lang="en-AU" smtClean="0"/>
-              <a:t>19/12/2023</a:t>
+              <a:t>20/12/2023</a:t>
             </a:fld>
             <a:endParaRPr lang="en-AU"/>
           </a:p>
@@ -866,7 +880,7 @@
           <a:p>
             <a:fld id="{11C67344-9475-469F-A7B3-18CCED384F34}" type="datetimeFigureOut">
               <a:rPr lang="en-AU" smtClean="0"/>
-              <a:t>19/12/2023</a:t>
+              <a:t>20/12/2023</a:t>
             </a:fld>
             <a:endParaRPr lang="en-AU"/>
           </a:p>
@@ -1142,7 +1156,7 @@
           <a:p>
             <a:fld id="{11C67344-9475-469F-A7B3-18CCED384F34}" type="datetimeFigureOut">
               <a:rPr lang="en-AU" smtClean="0"/>
-              <a:t>19/12/2023</a:t>
+              <a:t>20/12/2023</a:t>
             </a:fld>
             <a:endParaRPr lang="en-AU"/>
           </a:p>
@@ -1410,7 +1424,7 @@
           <a:p>
             <a:fld id="{11C67344-9475-469F-A7B3-18CCED384F34}" type="datetimeFigureOut">
               <a:rPr lang="en-AU" smtClean="0"/>
-              <a:t>19/12/2023</a:t>
+              <a:t>20/12/2023</a:t>
             </a:fld>
             <a:endParaRPr lang="en-AU"/>
           </a:p>
@@ -1825,7 +1839,7 @@
           <a:p>
             <a:fld id="{11C67344-9475-469F-A7B3-18CCED384F34}" type="datetimeFigureOut">
               <a:rPr lang="en-AU" smtClean="0"/>
-              <a:t>19/12/2023</a:t>
+              <a:t>20/12/2023</a:t>
             </a:fld>
             <a:endParaRPr lang="en-AU"/>
           </a:p>
@@ -1967,7 +1981,7 @@
           <a:p>
             <a:fld id="{11C67344-9475-469F-A7B3-18CCED384F34}" type="datetimeFigureOut">
               <a:rPr lang="en-AU" smtClean="0"/>
-              <a:t>19/12/2023</a:t>
+              <a:t>20/12/2023</a:t>
             </a:fld>
             <a:endParaRPr lang="en-AU"/>
           </a:p>
@@ -2080,7 +2094,7 @@
           <a:p>
             <a:fld id="{11C67344-9475-469F-A7B3-18CCED384F34}" type="datetimeFigureOut">
               <a:rPr lang="en-AU" smtClean="0"/>
-              <a:t>19/12/2023</a:t>
+              <a:t>20/12/2023</a:t>
             </a:fld>
             <a:endParaRPr lang="en-AU"/>
           </a:p>
@@ -2393,7 +2407,7 @@
           <a:p>
             <a:fld id="{11C67344-9475-469F-A7B3-18CCED384F34}" type="datetimeFigureOut">
               <a:rPr lang="en-AU" smtClean="0"/>
-              <a:t>19/12/2023</a:t>
+              <a:t>20/12/2023</a:t>
             </a:fld>
             <a:endParaRPr lang="en-AU"/>
           </a:p>
@@ -2682,7 +2696,7 @@
           <a:p>
             <a:fld id="{11C67344-9475-469F-A7B3-18CCED384F34}" type="datetimeFigureOut">
               <a:rPr lang="en-AU" smtClean="0"/>
-              <a:t>19/12/2023</a:t>
+              <a:t>20/12/2023</a:t>
             </a:fld>
             <a:endParaRPr lang="en-AU"/>
           </a:p>
@@ -2925,7 +2939,7 @@
           <a:p>
             <a:fld id="{11C67344-9475-469F-A7B3-18CCED384F34}" type="datetimeFigureOut">
               <a:rPr lang="en-AU" smtClean="0"/>
-              <a:t>19/12/2023</a:t>
+              <a:t>20/12/2023</a:t>
             </a:fld>
             <a:endParaRPr lang="en-AU"/>
           </a:p>
@@ -3396,7 +3410,10 @@
           <a:bodyPr/>
           <a:lstStyle/>
           <a:p>
-            <a:endParaRPr lang="en-AU" dirty="0"/>
+            <a:r>
+              <a:rPr lang="en-AU" dirty="0"/>
+              <a:t>Coffee </a:t>
+            </a:r>
           </a:p>
         </p:txBody>
       </p:sp>
@@ -3404,6 +3421,2582 @@
     <p:extLst>
       <p:ext uri="{BB962C8B-B14F-4D97-AF65-F5344CB8AC3E}">
         <p14:creationId xmlns:p14="http://schemas.microsoft.com/office/powerpoint/2010/main" val="3405347032"/>
+      </p:ext>
+    </p:extLst>
+  </p:cSld>
+  <p:clrMapOvr>
+    <a:masterClrMapping/>
+  </p:clrMapOvr>
+</p:sld>
+</file>
+
+<file path=ppt/slides/slide10.xml><?xml version="1.0" encoding="utf-8"?>
+<p:sld xmlns:a="http://schemas.openxmlformats.org/drawingml/2006/main" xmlns:r="http://schemas.openxmlformats.org/officeDocument/2006/relationships" xmlns:p="http://schemas.openxmlformats.org/presentationml/2006/main">
+  <p:cSld>
+    <p:spTree>
+      <p:nvGrpSpPr>
+        <p:cNvPr id="1" name=""/>
+        <p:cNvGrpSpPr/>
+        <p:nvPr/>
+      </p:nvGrpSpPr>
+      <p:grpSpPr>
+        <a:xfrm>
+          <a:off x="0" y="0"/>
+          <a:ext cx="0" cy="0"/>
+          <a:chOff x="0" y="0"/>
+          <a:chExt cx="0" cy="0"/>
+        </a:xfrm>
+      </p:grpSpPr>
+      <p:sp>
+        <p:nvSpPr>
+          <p:cNvPr id="2" name="Title 1">
+            <a:extLst>
+              <a:ext uri="{FF2B5EF4-FFF2-40B4-BE49-F238E27FC236}">
+                <a16:creationId xmlns:a16="http://schemas.microsoft.com/office/drawing/2014/main" id="{8FEA49B4-36A6-F0A5-B8E2-B3C39CFCF52B}"/>
+              </a:ext>
+            </a:extLst>
+          </p:cNvPr>
+          <p:cNvSpPr>
+            <a:spLocks noGrp="1"/>
+          </p:cNvSpPr>
+          <p:nvPr>
+            <p:ph type="title"/>
+          </p:nvPr>
+        </p:nvSpPr>
+        <p:spPr/>
+        <p:txBody>
+          <a:bodyPr/>
+          <a:lstStyle/>
+          <a:p>
+            <a:r>
+              <a:rPr lang="en-AU" dirty="0"/>
+              <a:t>Sign Language ML</a:t>
+            </a:r>
+          </a:p>
+        </p:txBody>
+      </p:sp>
+      <p:sp>
+        <p:nvSpPr>
+          <p:cNvPr id="3" name="Content Placeholder 2">
+            <a:extLst>
+              <a:ext uri="{FF2B5EF4-FFF2-40B4-BE49-F238E27FC236}">
+                <a16:creationId xmlns:a16="http://schemas.microsoft.com/office/drawing/2014/main" id="{A1B6A938-A229-9FA2-3FB5-D0DA5FA5633A}"/>
+              </a:ext>
+            </a:extLst>
+          </p:cNvPr>
+          <p:cNvSpPr>
+            <a:spLocks noGrp="1"/>
+          </p:cNvSpPr>
+          <p:nvPr>
+            <p:ph idx="1"/>
+          </p:nvPr>
+        </p:nvSpPr>
+        <p:spPr/>
+        <p:txBody>
+          <a:bodyPr/>
+          <a:lstStyle/>
+          <a:p>
+            <a:endParaRPr lang="en-AU"/>
+          </a:p>
+        </p:txBody>
+      </p:sp>
+    </p:spTree>
+    <p:extLst>
+      <p:ext uri="{BB962C8B-B14F-4D97-AF65-F5344CB8AC3E}">
+        <p14:creationId xmlns:p14="http://schemas.microsoft.com/office/powerpoint/2010/main" val="672797471"/>
+      </p:ext>
+    </p:extLst>
+  </p:cSld>
+  <p:clrMapOvr>
+    <a:masterClrMapping/>
+  </p:clrMapOvr>
+</p:sld>
+</file>
+
+<file path=ppt/slides/slide2.xml><?xml version="1.0" encoding="utf-8"?>
+<p:sld xmlns:a="http://schemas.openxmlformats.org/drawingml/2006/main" xmlns:r="http://schemas.openxmlformats.org/officeDocument/2006/relationships" xmlns:p="http://schemas.openxmlformats.org/presentationml/2006/main">
+  <p:cSld>
+    <p:spTree>
+      <p:nvGrpSpPr>
+        <p:cNvPr id="1" name=""/>
+        <p:cNvGrpSpPr/>
+        <p:nvPr/>
+      </p:nvGrpSpPr>
+      <p:grpSpPr>
+        <a:xfrm>
+          <a:off x="0" y="0"/>
+          <a:ext cx="0" cy="0"/>
+          <a:chOff x="0" y="0"/>
+          <a:chExt cx="0" cy="0"/>
+        </a:xfrm>
+      </p:grpSpPr>
+      <p:sp>
+        <p:nvSpPr>
+          <p:cNvPr id="2" name="Title 1">
+            <a:extLst>
+              <a:ext uri="{FF2B5EF4-FFF2-40B4-BE49-F238E27FC236}">
+                <a16:creationId xmlns:a16="http://schemas.microsoft.com/office/drawing/2014/main" id="{C05C819C-B88C-9830-7A2B-AFEAF2F69190}"/>
+              </a:ext>
+            </a:extLst>
+          </p:cNvPr>
+          <p:cNvSpPr>
+            <a:spLocks noGrp="1"/>
+          </p:cNvSpPr>
+          <p:nvPr>
+            <p:ph type="title"/>
+          </p:nvPr>
+        </p:nvSpPr>
+        <p:spPr/>
+        <p:txBody>
+          <a:bodyPr/>
+          <a:lstStyle/>
+          <a:p>
+            <a:endParaRPr lang="en-AU" dirty="0"/>
+          </a:p>
+        </p:txBody>
+      </p:sp>
+      <p:pic>
+        <p:nvPicPr>
+          <p:cNvPr id="5" name="Content Placeholder 4">
+            <a:extLst>
+              <a:ext uri="{FF2B5EF4-FFF2-40B4-BE49-F238E27FC236}">
+                <a16:creationId xmlns:a16="http://schemas.microsoft.com/office/drawing/2014/main" id="{BF081FE8-1467-C173-FCAB-5B625342E938}"/>
+              </a:ext>
+            </a:extLst>
+          </p:cNvPr>
+          <p:cNvPicPr>
+            <a:picLocks noGrp="1" noChangeAspect="1"/>
+          </p:cNvPicPr>
+          <p:nvPr>
+            <p:ph idx="1"/>
+          </p:nvPr>
+        </p:nvPicPr>
+        <p:blipFill>
+          <a:blip r:embed="rId2"/>
+          <a:stretch>
+            <a:fillRect/>
+          </a:stretch>
+        </p:blipFill>
+        <p:spPr>
+          <a:xfrm>
+            <a:off x="1830028" y="1825625"/>
+            <a:ext cx="8531944" cy="4351338"/>
+          </a:xfrm>
+        </p:spPr>
+      </p:pic>
+    </p:spTree>
+    <p:extLst>
+      <p:ext uri="{BB962C8B-B14F-4D97-AF65-F5344CB8AC3E}">
+        <p14:creationId xmlns:p14="http://schemas.microsoft.com/office/powerpoint/2010/main" val="1853550720"/>
+      </p:ext>
+    </p:extLst>
+  </p:cSld>
+  <p:clrMapOvr>
+    <a:masterClrMapping/>
+  </p:clrMapOvr>
+</p:sld>
+</file>
+
+<file path=ppt/slides/slide3.xml><?xml version="1.0" encoding="utf-8"?>
+<p:sld xmlns:a="http://schemas.openxmlformats.org/drawingml/2006/main" xmlns:r="http://schemas.openxmlformats.org/officeDocument/2006/relationships" xmlns:p="http://schemas.openxmlformats.org/presentationml/2006/main">
+  <p:cSld>
+    <p:spTree>
+      <p:nvGrpSpPr>
+        <p:cNvPr id="1" name=""/>
+        <p:cNvGrpSpPr/>
+        <p:nvPr/>
+      </p:nvGrpSpPr>
+      <p:grpSpPr>
+        <a:xfrm>
+          <a:off x="0" y="0"/>
+          <a:ext cx="0" cy="0"/>
+          <a:chOff x="0" y="0"/>
+          <a:chExt cx="0" cy="0"/>
+        </a:xfrm>
+      </p:grpSpPr>
+      <p:sp>
+        <p:nvSpPr>
+          <p:cNvPr id="2" name="Title 1">
+            <a:extLst>
+              <a:ext uri="{FF2B5EF4-FFF2-40B4-BE49-F238E27FC236}">
+                <a16:creationId xmlns:a16="http://schemas.microsoft.com/office/drawing/2014/main" id="{A58D5FEC-8198-47BD-1A78-A5F2CC1218AC}"/>
+              </a:ext>
+            </a:extLst>
+          </p:cNvPr>
+          <p:cNvSpPr>
+            <a:spLocks noGrp="1"/>
+          </p:cNvSpPr>
+          <p:nvPr>
+            <p:ph type="title"/>
+          </p:nvPr>
+        </p:nvSpPr>
+        <p:spPr/>
+        <p:txBody>
+          <a:bodyPr/>
+          <a:lstStyle/>
+          <a:p>
+            <a:endParaRPr lang="en-AU"/>
+          </a:p>
+        </p:txBody>
+      </p:sp>
+      <p:sp>
+        <p:nvSpPr>
+          <p:cNvPr id="3" name="Content Placeholder 2">
+            <a:extLst>
+              <a:ext uri="{FF2B5EF4-FFF2-40B4-BE49-F238E27FC236}">
+                <a16:creationId xmlns:a16="http://schemas.microsoft.com/office/drawing/2014/main" id="{F3D2B5C9-4C68-96CF-3C05-9635BE293B61}"/>
+              </a:ext>
+            </a:extLst>
+          </p:cNvPr>
+          <p:cNvSpPr>
+            <a:spLocks noGrp="1"/>
+          </p:cNvSpPr>
+          <p:nvPr>
+            <p:ph idx="1"/>
+          </p:nvPr>
+        </p:nvSpPr>
+        <p:spPr/>
+        <p:txBody>
+          <a:bodyPr/>
+          <a:lstStyle/>
+          <a:p>
+            <a:endParaRPr lang="en-AU"/>
+          </a:p>
+        </p:txBody>
+      </p:sp>
+      <p:pic>
+        <p:nvPicPr>
+          <p:cNvPr id="5" name="Picture 4">
+            <a:extLst>
+              <a:ext uri="{FF2B5EF4-FFF2-40B4-BE49-F238E27FC236}">
+                <a16:creationId xmlns:a16="http://schemas.microsoft.com/office/drawing/2014/main" id="{47EF845B-0B2E-9BF8-F59E-2BBE8AAF5F58}"/>
+              </a:ext>
+            </a:extLst>
+          </p:cNvPr>
+          <p:cNvPicPr>
+            <a:picLocks noChangeAspect="1"/>
+          </p:cNvPicPr>
+          <p:nvPr/>
+        </p:nvPicPr>
+        <p:blipFill>
+          <a:blip r:embed="rId2"/>
+          <a:stretch>
+            <a:fillRect/>
+          </a:stretch>
+        </p:blipFill>
+        <p:spPr>
+          <a:xfrm>
+            <a:off x="0" y="320007"/>
+            <a:ext cx="12192000" cy="6217986"/>
+          </a:xfrm>
+          <a:prstGeom prst="rect">
+            <a:avLst/>
+          </a:prstGeom>
+        </p:spPr>
+      </p:pic>
+      <p:sp>
+        <p:nvSpPr>
+          <p:cNvPr id="6" name="Rectangle 5">
+            <a:extLst>
+              <a:ext uri="{FF2B5EF4-FFF2-40B4-BE49-F238E27FC236}">
+                <a16:creationId xmlns:a16="http://schemas.microsoft.com/office/drawing/2014/main" id="{AF735642-65F9-AEA9-4DF6-5E73C5AFBE2E}"/>
+              </a:ext>
+            </a:extLst>
+          </p:cNvPr>
+          <p:cNvSpPr/>
+          <p:nvPr/>
+        </p:nvSpPr>
+        <p:spPr>
+          <a:xfrm>
+            <a:off x="1530221" y="2077665"/>
+            <a:ext cx="4245429" cy="2146041"/>
+          </a:xfrm>
+          <a:prstGeom prst="rect">
+            <a:avLst/>
+          </a:prstGeom>
+        </p:spPr>
+        <p:style>
+          <a:lnRef idx="2">
+            <a:schemeClr val="accent1">
+              <a:shade val="15000"/>
+            </a:schemeClr>
+          </a:lnRef>
+          <a:fillRef idx="1">
+            <a:schemeClr val="accent1"/>
+          </a:fillRef>
+          <a:effectRef idx="0">
+            <a:schemeClr val="accent1"/>
+          </a:effectRef>
+          <a:fontRef idx="minor">
+            <a:schemeClr val="lt1"/>
+          </a:fontRef>
+        </p:style>
+        <p:txBody>
+          <a:bodyPr rtlCol="0" anchor="ctr"/>
+          <a:lstStyle/>
+          <a:p>
+            <a:pPr algn="ctr"/>
+            <a:endParaRPr lang="en-AU"/>
+          </a:p>
+        </p:txBody>
+      </p:sp>
+      <p:sp>
+        <p:nvSpPr>
+          <p:cNvPr id="7" name="Rectangle 6">
+            <a:extLst>
+              <a:ext uri="{FF2B5EF4-FFF2-40B4-BE49-F238E27FC236}">
+                <a16:creationId xmlns:a16="http://schemas.microsoft.com/office/drawing/2014/main" id="{BA9D7697-B25C-A732-069A-763F690DB237}"/>
+              </a:ext>
+            </a:extLst>
+          </p:cNvPr>
+          <p:cNvSpPr/>
+          <p:nvPr/>
+        </p:nvSpPr>
+        <p:spPr>
+          <a:xfrm>
+            <a:off x="5968482" y="2077665"/>
+            <a:ext cx="4245429" cy="2146041"/>
+          </a:xfrm>
+          <a:prstGeom prst="rect">
+            <a:avLst/>
+          </a:prstGeom>
+        </p:spPr>
+        <p:style>
+          <a:lnRef idx="2">
+            <a:schemeClr val="accent1">
+              <a:shade val="15000"/>
+            </a:schemeClr>
+          </a:lnRef>
+          <a:fillRef idx="1">
+            <a:schemeClr val="accent1"/>
+          </a:fillRef>
+          <a:effectRef idx="0">
+            <a:schemeClr val="accent1"/>
+          </a:effectRef>
+          <a:fontRef idx="minor">
+            <a:schemeClr val="lt1"/>
+          </a:fontRef>
+        </p:style>
+        <p:txBody>
+          <a:bodyPr rtlCol="0" anchor="ctr"/>
+          <a:lstStyle/>
+          <a:p>
+            <a:pPr algn="ctr"/>
+            <a:endParaRPr lang="en-AU"/>
+          </a:p>
+        </p:txBody>
+      </p:sp>
+      <p:sp>
+        <p:nvSpPr>
+          <p:cNvPr id="8" name="TextBox 7">
+            <a:extLst>
+              <a:ext uri="{FF2B5EF4-FFF2-40B4-BE49-F238E27FC236}">
+                <a16:creationId xmlns:a16="http://schemas.microsoft.com/office/drawing/2014/main" id="{F5B6BA4E-BAB6-F814-2755-691B0D7AF23B}"/>
+              </a:ext>
+            </a:extLst>
+          </p:cNvPr>
+          <p:cNvSpPr txBox="1"/>
+          <p:nvPr/>
+        </p:nvSpPr>
+        <p:spPr>
+          <a:xfrm>
+            <a:off x="2281336" y="2751615"/>
+            <a:ext cx="2547257" cy="646331"/>
+          </a:xfrm>
+          <a:prstGeom prst="rect">
+            <a:avLst/>
+          </a:prstGeom>
+          <a:noFill/>
+        </p:spPr>
+        <p:txBody>
+          <a:bodyPr wrap="square" rtlCol="0">
+            <a:spAutoFit/>
+          </a:bodyPr>
+          <a:lstStyle/>
+          <a:p>
+            <a:r>
+              <a:rPr lang="en-AU" dirty="0"/>
+              <a:t>Robusta</a:t>
+            </a:r>
+          </a:p>
+          <a:p>
+            <a:r>
+              <a:rPr lang="en-AU" dirty="0"/>
+              <a:t>add description </a:t>
+            </a:r>
+          </a:p>
+        </p:txBody>
+      </p:sp>
+      <p:sp>
+        <p:nvSpPr>
+          <p:cNvPr id="9" name="TextBox 8">
+            <a:extLst>
+              <a:ext uri="{FF2B5EF4-FFF2-40B4-BE49-F238E27FC236}">
+                <a16:creationId xmlns:a16="http://schemas.microsoft.com/office/drawing/2014/main" id="{65BBE36C-7296-225B-6743-81AD2B6870A7}"/>
+              </a:ext>
+            </a:extLst>
+          </p:cNvPr>
+          <p:cNvSpPr txBox="1"/>
+          <p:nvPr/>
+        </p:nvSpPr>
+        <p:spPr>
+          <a:xfrm>
+            <a:off x="6652727" y="2784463"/>
+            <a:ext cx="2547257" cy="646331"/>
+          </a:xfrm>
+          <a:prstGeom prst="rect">
+            <a:avLst/>
+          </a:prstGeom>
+          <a:noFill/>
+        </p:spPr>
+        <p:txBody>
+          <a:bodyPr wrap="square" rtlCol="0">
+            <a:spAutoFit/>
+          </a:bodyPr>
+          <a:lstStyle/>
+          <a:p>
+            <a:r>
+              <a:rPr lang="en-AU" dirty="0"/>
+              <a:t>Arabica  </a:t>
+            </a:r>
+          </a:p>
+          <a:p>
+            <a:r>
+              <a:rPr lang="en-AU" dirty="0"/>
+              <a:t>add description </a:t>
+            </a:r>
+          </a:p>
+        </p:txBody>
+      </p:sp>
+    </p:spTree>
+    <p:extLst>
+      <p:ext uri="{BB962C8B-B14F-4D97-AF65-F5344CB8AC3E}">
+        <p14:creationId xmlns:p14="http://schemas.microsoft.com/office/powerpoint/2010/main" val="865794264"/>
+      </p:ext>
+    </p:extLst>
+  </p:cSld>
+  <p:clrMapOvr>
+    <a:masterClrMapping/>
+  </p:clrMapOvr>
+</p:sld>
+</file>
+
+<file path=ppt/slides/slide4.xml><?xml version="1.0" encoding="utf-8"?>
+<p:sld xmlns:a="http://schemas.openxmlformats.org/drawingml/2006/main" xmlns:r="http://schemas.openxmlformats.org/officeDocument/2006/relationships" xmlns:p="http://schemas.openxmlformats.org/presentationml/2006/main">
+  <p:cSld>
+    <p:spTree>
+      <p:nvGrpSpPr>
+        <p:cNvPr id="1" name=""/>
+        <p:cNvGrpSpPr/>
+        <p:nvPr/>
+      </p:nvGrpSpPr>
+      <p:grpSpPr>
+        <a:xfrm>
+          <a:off x="0" y="0"/>
+          <a:ext cx="0" cy="0"/>
+          <a:chOff x="0" y="0"/>
+          <a:chExt cx="0" cy="0"/>
+        </a:xfrm>
+      </p:grpSpPr>
+      <p:sp>
+        <p:nvSpPr>
+          <p:cNvPr id="2" name="Title 1">
+            <a:extLst>
+              <a:ext uri="{FF2B5EF4-FFF2-40B4-BE49-F238E27FC236}">
+                <a16:creationId xmlns:a16="http://schemas.microsoft.com/office/drawing/2014/main" id="{A58D5FEC-8198-47BD-1A78-A5F2CC1218AC}"/>
+              </a:ext>
+            </a:extLst>
+          </p:cNvPr>
+          <p:cNvSpPr>
+            <a:spLocks noGrp="1"/>
+          </p:cNvSpPr>
+          <p:nvPr>
+            <p:ph type="title"/>
+          </p:nvPr>
+        </p:nvSpPr>
+        <p:spPr/>
+        <p:txBody>
+          <a:bodyPr/>
+          <a:lstStyle/>
+          <a:p>
+            <a:endParaRPr lang="en-AU"/>
+          </a:p>
+        </p:txBody>
+      </p:sp>
+      <p:sp>
+        <p:nvSpPr>
+          <p:cNvPr id="3" name="Content Placeholder 2">
+            <a:extLst>
+              <a:ext uri="{FF2B5EF4-FFF2-40B4-BE49-F238E27FC236}">
+                <a16:creationId xmlns:a16="http://schemas.microsoft.com/office/drawing/2014/main" id="{F3D2B5C9-4C68-96CF-3C05-9635BE293B61}"/>
+              </a:ext>
+            </a:extLst>
+          </p:cNvPr>
+          <p:cNvSpPr>
+            <a:spLocks noGrp="1"/>
+          </p:cNvSpPr>
+          <p:nvPr>
+            <p:ph idx="1"/>
+          </p:nvPr>
+        </p:nvSpPr>
+        <p:spPr/>
+        <p:txBody>
+          <a:bodyPr/>
+          <a:lstStyle/>
+          <a:p>
+            <a:endParaRPr lang="en-AU"/>
+          </a:p>
+        </p:txBody>
+      </p:sp>
+      <p:pic>
+        <p:nvPicPr>
+          <p:cNvPr id="5" name="Picture 4">
+            <a:extLst>
+              <a:ext uri="{FF2B5EF4-FFF2-40B4-BE49-F238E27FC236}">
+                <a16:creationId xmlns:a16="http://schemas.microsoft.com/office/drawing/2014/main" id="{47EF845B-0B2E-9BF8-F59E-2BBE8AAF5F58}"/>
+              </a:ext>
+            </a:extLst>
+          </p:cNvPr>
+          <p:cNvPicPr>
+            <a:picLocks noChangeAspect="1"/>
+          </p:cNvPicPr>
+          <p:nvPr/>
+        </p:nvPicPr>
+        <p:blipFill>
+          <a:blip r:embed="rId2"/>
+          <a:stretch>
+            <a:fillRect/>
+          </a:stretch>
+        </p:blipFill>
+        <p:spPr>
+          <a:xfrm>
+            <a:off x="0" y="320007"/>
+            <a:ext cx="12192000" cy="6217986"/>
+          </a:xfrm>
+          <a:prstGeom prst="rect">
+            <a:avLst/>
+          </a:prstGeom>
+        </p:spPr>
+      </p:pic>
+      <p:sp>
+        <p:nvSpPr>
+          <p:cNvPr id="6" name="Rectangle 5">
+            <a:extLst>
+              <a:ext uri="{FF2B5EF4-FFF2-40B4-BE49-F238E27FC236}">
+                <a16:creationId xmlns:a16="http://schemas.microsoft.com/office/drawing/2014/main" id="{AF735642-65F9-AEA9-4DF6-5E73C5AFBE2E}"/>
+              </a:ext>
+            </a:extLst>
+          </p:cNvPr>
+          <p:cNvSpPr/>
+          <p:nvPr/>
+        </p:nvSpPr>
+        <p:spPr>
+          <a:xfrm>
+            <a:off x="1432249" y="2077665"/>
+            <a:ext cx="4245429" cy="2146041"/>
+          </a:xfrm>
+          <a:prstGeom prst="rect">
+            <a:avLst/>
+          </a:prstGeom>
+        </p:spPr>
+        <p:style>
+          <a:lnRef idx="2">
+            <a:schemeClr val="accent1">
+              <a:shade val="15000"/>
+            </a:schemeClr>
+          </a:lnRef>
+          <a:fillRef idx="1">
+            <a:schemeClr val="accent1"/>
+          </a:fillRef>
+          <a:effectRef idx="0">
+            <a:schemeClr val="accent1"/>
+          </a:effectRef>
+          <a:fontRef idx="minor">
+            <a:schemeClr val="lt1"/>
+          </a:fontRef>
+        </p:style>
+        <p:txBody>
+          <a:bodyPr rtlCol="0" anchor="ctr"/>
+          <a:lstStyle/>
+          <a:p>
+            <a:pPr algn="ctr"/>
+            <a:endParaRPr lang="en-AU"/>
+          </a:p>
+        </p:txBody>
+      </p:sp>
+      <p:sp>
+        <p:nvSpPr>
+          <p:cNvPr id="7" name="Rectangle 6">
+            <a:extLst>
+              <a:ext uri="{FF2B5EF4-FFF2-40B4-BE49-F238E27FC236}">
+                <a16:creationId xmlns:a16="http://schemas.microsoft.com/office/drawing/2014/main" id="{BA9D7697-B25C-A732-069A-763F690DB237}"/>
+              </a:ext>
+            </a:extLst>
+          </p:cNvPr>
+          <p:cNvSpPr/>
+          <p:nvPr/>
+        </p:nvSpPr>
+        <p:spPr>
+          <a:xfrm>
+            <a:off x="5968482" y="2077665"/>
+            <a:ext cx="4245429" cy="2146041"/>
+          </a:xfrm>
+          <a:prstGeom prst="rect">
+            <a:avLst/>
+          </a:prstGeom>
+        </p:spPr>
+        <p:style>
+          <a:lnRef idx="2">
+            <a:schemeClr val="accent1">
+              <a:shade val="15000"/>
+            </a:schemeClr>
+          </a:lnRef>
+          <a:fillRef idx="1">
+            <a:schemeClr val="accent1"/>
+          </a:fillRef>
+          <a:effectRef idx="0">
+            <a:schemeClr val="accent1"/>
+          </a:effectRef>
+          <a:fontRef idx="minor">
+            <a:schemeClr val="lt1"/>
+          </a:fontRef>
+        </p:style>
+        <p:txBody>
+          <a:bodyPr rtlCol="0" anchor="ctr"/>
+          <a:lstStyle/>
+          <a:p>
+            <a:pPr algn="ctr"/>
+            <a:endParaRPr lang="en-AU"/>
+          </a:p>
+        </p:txBody>
+      </p:sp>
+      <p:sp>
+        <p:nvSpPr>
+          <p:cNvPr id="8" name="TextBox 7">
+            <a:extLst>
+              <a:ext uri="{FF2B5EF4-FFF2-40B4-BE49-F238E27FC236}">
+                <a16:creationId xmlns:a16="http://schemas.microsoft.com/office/drawing/2014/main" id="{F5B6BA4E-BAB6-F814-2755-691B0D7AF23B}"/>
+              </a:ext>
+            </a:extLst>
+          </p:cNvPr>
+          <p:cNvSpPr txBox="1"/>
+          <p:nvPr/>
+        </p:nvSpPr>
+        <p:spPr>
+          <a:xfrm>
+            <a:off x="2281336" y="2751615"/>
+            <a:ext cx="2547257" cy="369332"/>
+          </a:xfrm>
+          <a:prstGeom prst="rect">
+            <a:avLst/>
+          </a:prstGeom>
+          <a:noFill/>
+        </p:spPr>
+        <p:txBody>
+          <a:bodyPr wrap="square" rtlCol="0">
+            <a:spAutoFit/>
+          </a:bodyPr>
+          <a:lstStyle/>
+          <a:p>
+            <a:r>
+              <a:rPr lang="en-AU" dirty="0"/>
+              <a:t>Yes </a:t>
+            </a:r>
+          </a:p>
+        </p:txBody>
+      </p:sp>
+      <p:sp>
+        <p:nvSpPr>
+          <p:cNvPr id="9" name="TextBox 8">
+            <a:extLst>
+              <a:ext uri="{FF2B5EF4-FFF2-40B4-BE49-F238E27FC236}">
+                <a16:creationId xmlns:a16="http://schemas.microsoft.com/office/drawing/2014/main" id="{65BBE36C-7296-225B-6743-81AD2B6870A7}"/>
+              </a:ext>
+            </a:extLst>
+          </p:cNvPr>
+          <p:cNvSpPr txBox="1"/>
+          <p:nvPr/>
+        </p:nvSpPr>
+        <p:spPr>
+          <a:xfrm>
+            <a:off x="6652727" y="2784463"/>
+            <a:ext cx="2547257" cy="369332"/>
+          </a:xfrm>
+          <a:prstGeom prst="rect">
+            <a:avLst/>
+          </a:prstGeom>
+          <a:noFill/>
+        </p:spPr>
+        <p:txBody>
+          <a:bodyPr wrap="square" rtlCol="0">
+            <a:spAutoFit/>
+          </a:bodyPr>
+          <a:lstStyle/>
+          <a:p>
+            <a:r>
+              <a:rPr lang="en-AU" dirty="0"/>
+              <a:t>No </a:t>
+            </a:r>
+          </a:p>
+        </p:txBody>
+      </p:sp>
+      <p:sp>
+        <p:nvSpPr>
+          <p:cNvPr id="4" name="TextBox 3">
+            <a:extLst>
+              <a:ext uri="{FF2B5EF4-FFF2-40B4-BE49-F238E27FC236}">
+                <a16:creationId xmlns:a16="http://schemas.microsoft.com/office/drawing/2014/main" id="{A4543A73-2EF8-EBB6-0F5E-60695FBF6F63}"/>
+              </a:ext>
+            </a:extLst>
+          </p:cNvPr>
+          <p:cNvSpPr txBox="1"/>
+          <p:nvPr/>
+        </p:nvSpPr>
+        <p:spPr>
+          <a:xfrm>
+            <a:off x="3357465" y="1388825"/>
+            <a:ext cx="5477069" cy="369332"/>
+          </a:xfrm>
+          <a:prstGeom prst="rect">
+            <a:avLst/>
+          </a:prstGeom>
+          <a:solidFill>
+            <a:schemeClr val="bg1"/>
+          </a:solidFill>
+        </p:spPr>
+        <p:txBody>
+          <a:bodyPr wrap="square" rtlCol="0">
+            <a:spAutoFit/>
+          </a:bodyPr>
+          <a:lstStyle/>
+          <a:p>
+            <a:r>
+              <a:rPr lang="en-AU" dirty="0"/>
+              <a:t>Do you prefer your coffee to be more aromatic? </a:t>
+            </a:r>
+          </a:p>
+        </p:txBody>
+      </p:sp>
+    </p:spTree>
+    <p:extLst>
+      <p:ext uri="{BB962C8B-B14F-4D97-AF65-F5344CB8AC3E}">
+        <p14:creationId xmlns:p14="http://schemas.microsoft.com/office/powerpoint/2010/main" val="1137325743"/>
+      </p:ext>
+    </p:extLst>
+  </p:cSld>
+  <p:clrMapOvr>
+    <a:masterClrMapping/>
+  </p:clrMapOvr>
+</p:sld>
+</file>
+
+<file path=ppt/slides/slide5.xml><?xml version="1.0" encoding="utf-8"?>
+<p:sld xmlns:a="http://schemas.openxmlformats.org/drawingml/2006/main" xmlns:r="http://schemas.openxmlformats.org/officeDocument/2006/relationships" xmlns:p="http://schemas.openxmlformats.org/presentationml/2006/main">
+  <p:cSld>
+    <p:spTree>
+      <p:nvGrpSpPr>
+        <p:cNvPr id="1" name=""/>
+        <p:cNvGrpSpPr/>
+        <p:nvPr/>
+      </p:nvGrpSpPr>
+      <p:grpSpPr>
+        <a:xfrm>
+          <a:off x="0" y="0"/>
+          <a:ext cx="0" cy="0"/>
+          <a:chOff x="0" y="0"/>
+          <a:chExt cx="0" cy="0"/>
+        </a:xfrm>
+      </p:grpSpPr>
+      <p:sp>
+        <p:nvSpPr>
+          <p:cNvPr id="2" name="Title 1">
+            <a:extLst>
+              <a:ext uri="{FF2B5EF4-FFF2-40B4-BE49-F238E27FC236}">
+                <a16:creationId xmlns:a16="http://schemas.microsoft.com/office/drawing/2014/main" id="{A58D5FEC-8198-47BD-1A78-A5F2CC1218AC}"/>
+              </a:ext>
+            </a:extLst>
+          </p:cNvPr>
+          <p:cNvSpPr>
+            <a:spLocks noGrp="1"/>
+          </p:cNvSpPr>
+          <p:nvPr>
+            <p:ph type="title"/>
+          </p:nvPr>
+        </p:nvSpPr>
+        <p:spPr/>
+        <p:txBody>
+          <a:bodyPr/>
+          <a:lstStyle/>
+          <a:p>
+            <a:endParaRPr lang="en-AU"/>
+          </a:p>
+        </p:txBody>
+      </p:sp>
+      <p:sp>
+        <p:nvSpPr>
+          <p:cNvPr id="3" name="Content Placeholder 2">
+            <a:extLst>
+              <a:ext uri="{FF2B5EF4-FFF2-40B4-BE49-F238E27FC236}">
+                <a16:creationId xmlns:a16="http://schemas.microsoft.com/office/drawing/2014/main" id="{F3D2B5C9-4C68-96CF-3C05-9635BE293B61}"/>
+              </a:ext>
+            </a:extLst>
+          </p:cNvPr>
+          <p:cNvSpPr>
+            <a:spLocks noGrp="1"/>
+          </p:cNvSpPr>
+          <p:nvPr>
+            <p:ph idx="1"/>
+          </p:nvPr>
+        </p:nvSpPr>
+        <p:spPr/>
+        <p:txBody>
+          <a:bodyPr/>
+          <a:lstStyle/>
+          <a:p>
+            <a:endParaRPr lang="en-AU"/>
+          </a:p>
+        </p:txBody>
+      </p:sp>
+      <p:pic>
+        <p:nvPicPr>
+          <p:cNvPr id="5" name="Picture 4">
+            <a:extLst>
+              <a:ext uri="{FF2B5EF4-FFF2-40B4-BE49-F238E27FC236}">
+                <a16:creationId xmlns:a16="http://schemas.microsoft.com/office/drawing/2014/main" id="{47EF845B-0B2E-9BF8-F59E-2BBE8AAF5F58}"/>
+              </a:ext>
+            </a:extLst>
+          </p:cNvPr>
+          <p:cNvPicPr>
+            <a:picLocks noChangeAspect="1"/>
+          </p:cNvPicPr>
+          <p:nvPr/>
+        </p:nvPicPr>
+        <p:blipFill>
+          <a:blip r:embed="rId2"/>
+          <a:stretch>
+            <a:fillRect/>
+          </a:stretch>
+        </p:blipFill>
+        <p:spPr>
+          <a:xfrm>
+            <a:off x="0" y="320007"/>
+            <a:ext cx="12192000" cy="6217986"/>
+          </a:xfrm>
+          <a:prstGeom prst="rect">
+            <a:avLst/>
+          </a:prstGeom>
+        </p:spPr>
+      </p:pic>
+      <p:sp>
+        <p:nvSpPr>
+          <p:cNvPr id="6" name="Rectangle 5">
+            <a:extLst>
+              <a:ext uri="{FF2B5EF4-FFF2-40B4-BE49-F238E27FC236}">
+                <a16:creationId xmlns:a16="http://schemas.microsoft.com/office/drawing/2014/main" id="{AF735642-65F9-AEA9-4DF6-5E73C5AFBE2E}"/>
+              </a:ext>
+            </a:extLst>
+          </p:cNvPr>
+          <p:cNvSpPr/>
+          <p:nvPr/>
+        </p:nvSpPr>
+        <p:spPr>
+          <a:xfrm>
+            <a:off x="1432249" y="2077665"/>
+            <a:ext cx="4245429" cy="2146041"/>
+          </a:xfrm>
+          <a:prstGeom prst="rect">
+            <a:avLst/>
+          </a:prstGeom>
+        </p:spPr>
+        <p:style>
+          <a:lnRef idx="2">
+            <a:schemeClr val="accent1">
+              <a:shade val="15000"/>
+            </a:schemeClr>
+          </a:lnRef>
+          <a:fillRef idx="1">
+            <a:schemeClr val="accent1"/>
+          </a:fillRef>
+          <a:effectRef idx="0">
+            <a:schemeClr val="accent1"/>
+          </a:effectRef>
+          <a:fontRef idx="minor">
+            <a:schemeClr val="lt1"/>
+          </a:fontRef>
+        </p:style>
+        <p:txBody>
+          <a:bodyPr rtlCol="0" anchor="ctr"/>
+          <a:lstStyle/>
+          <a:p>
+            <a:pPr algn="ctr"/>
+            <a:endParaRPr lang="en-AU"/>
+          </a:p>
+        </p:txBody>
+      </p:sp>
+      <p:sp>
+        <p:nvSpPr>
+          <p:cNvPr id="7" name="Rectangle 6">
+            <a:extLst>
+              <a:ext uri="{FF2B5EF4-FFF2-40B4-BE49-F238E27FC236}">
+                <a16:creationId xmlns:a16="http://schemas.microsoft.com/office/drawing/2014/main" id="{BA9D7697-B25C-A732-069A-763F690DB237}"/>
+              </a:ext>
+            </a:extLst>
+          </p:cNvPr>
+          <p:cNvSpPr/>
+          <p:nvPr/>
+        </p:nvSpPr>
+        <p:spPr>
+          <a:xfrm>
+            <a:off x="5968482" y="2077665"/>
+            <a:ext cx="4245429" cy="2146041"/>
+          </a:xfrm>
+          <a:prstGeom prst="rect">
+            <a:avLst/>
+          </a:prstGeom>
+        </p:spPr>
+        <p:style>
+          <a:lnRef idx="2">
+            <a:schemeClr val="accent1">
+              <a:shade val="15000"/>
+            </a:schemeClr>
+          </a:lnRef>
+          <a:fillRef idx="1">
+            <a:schemeClr val="accent1"/>
+          </a:fillRef>
+          <a:effectRef idx="0">
+            <a:schemeClr val="accent1"/>
+          </a:effectRef>
+          <a:fontRef idx="minor">
+            <a:schemeClr val="lt1"/>
+          </a:fontRef>
+        </p:style>
+        <p:txBody>
+          <a:bodyPr rtlCol="0" anchor="ctr"/>
+          <a:lstStyle/>
+          <a:p>
+            <a:pPr algn="ctr"/>
+            <a:endParaRPr lang="en-AU"/>
+          </a:p>
+        </p:txBody>
+      </p:sp>
+      <p:sp>
+        <p:nvSpPr>
+          <p:cNvPr id="8" name="TextBox 7">
+            <a:extLst>
+              <a:ext uri="{FF2B5EF4-FFF2-40B4-BE49-F238E27FC236}">
+                <a16:creationId xmlns:a16="http://schemas.microsoft.com/office/drawing/2014/main" id="{F5B6BA4E-BAB6-F814-2755-691B0D7AF23B}"/>
+              </a:ext>
+            </a:extLst>
+          </p:cNvPr>
+          <p:cNvSpPr txBox="1"/>
+          <p:nvPr/>
+        </p:nvSpPr>
+        <p:spPr>
+          <a:xfrm>
+            <a:off x="2281336" y="2751615"/>
+            <a:ext cx="2547257" cy="369332"/>
+          </a:xfrm>
+          <a:prstGeom prst="rect">
+            <a:avLst/>
+          </a:prstGeom>
+          <a:noFill/>
+        </p:spPr>
+        <p:txBody>
+          <a:bodyPr wrap="square" rtlCol="0">
+            <a:spAutoFit/>
+          </a:bodyPr>
+          <a:lstStyle/>
+          <a:p>
+            <a:r>
+              <a:rPr lang="en-AU" dirty="0"/>
+              <a:t>Strong  </a:t>
+            </a:r>
+          </a:p>
+        </p:txBody>
+      </p:sp>
+      <p:sp>
+        <p:nvSpPr>
+          <p:cNvPr id="9" name="TextBox 8">
+            <a:extLst>
+              <a:ext uri="{FF2B5EF4-FFF2-40B4-BE49-F238E27FC236}">
+                <a16:creationId xmlns:a16="http://schemas.microsoft.com/office/drawing/2014/main" id="{65BBE36C-7296-225B-6743-81AD2B6870A7}"/>
+              </a:ext>
+            </a:extLst>
+          </p:cNvPr>
+          <p:cNvSpPr txBox="1"/>
+          <p:nvPr/>
+        </p:nvSpPr>
+        <p:spPr>
+          <a:xfrm>
+            <a:off x="6652727" y="2784463"/>
+            <a:ext cx="2547257" cy="369332"/>
+          </a:xfrm>
+          <a:prstGeom prst="rect">
+            <a:avLst/>
+          </a:prstGeom>
+          <a:noFill/>
+        </p:spPr>
+        <p:txBody>
+          <a:bodyPr wrap="square" rtlCol="0">
+            <a:spAutoFit/>
+          </a:bodyPr>
+          <a:lstStyle/>
+          <a:p>
+            <a:r>
+              <a:rPr lang="en-AU" dirty="0"/>
+              <a:t>Weak </a:t>
+            </a:r>
+          </a:p>
+        </p:txBody>
+      </p:sp>
+      <p:sp>
+        <p:nvSpPr>
+          <p:cNvPr id="4" name="TextBox 3">
+            <a:extLst>
+              <a:ext uri="{FF2B5EF4-FFF2-40B4-BE49-F238E27FC236}">
+                <a16:creationId xmlns:a16="http://schemas.microsoft.com/office/drawing/2014/main" id="{A4543A73-2EF8-EBB6-0F5E-60695FBF6F63}"/>
+              </a:ext>
+            </a:extLst>
+          </p:cNvPr>
+          <p:cNvSpPr txBox="1"/>
+          <p:nvPr/>
+        </p:nvSpPr>
+        <p:spPr>
+          <a:xfrm>
+            <a:off x="3357465" y="1388825"/>
+            <a:ext cx="5477069" cy="369332"/>
+          </a:xfrm>
+          <a:prstGeom prst="rect">
+            <a:avLst/>
+          </a:prstGeom>
+          <a:solidFill>
+            <a:schemeClr val="bg1"/>
+          </a:solidFill>
+        </p:spPr>
+        <p:txBody>
+          <a:bodyPr wrap="square" rtlCol="0">
+            <a:spAutoFit/>
+          </a:bodyPr>
+          <a:lstStyle/>
+          <a:p>
+            <a:r>
+              <a:rPr lang="en-AU" dirty="0"/>
+              <a:t>Strong or Weak </a:t>
+            </a:r>
+          </a:p>
+        </p:txBody>
+      </p:sp>
+    </p:spTree>
+    <p:extLst>
+      <p:ext uri="{BB962C8B-B14F-4D97-AF65-F5344CB8AC3E}">
+        <p14:creationId xmlns:p14="http://schemas.microsoft.com/office/powerpoint/2010/main" val="823907224"/>
+      </p:ext>
+    </p:extLst>
+  </p:cSld>
+  <p:clrMapOvr>
+    <a:masterClrMapping/>
+  </p:clrMapOvr>
+</p:sld>
+</file>
+
+<file path=ppt/slides/slide6.xml><?xml version="1.0" encoding="utf-8"?>
+<p:sld xmlns:a="http://schemas.openxmlformats.org/drawingml/2006/main" xmlns:r="http://schemas.openxmlformats.org/officeDocument/2006/relationships" xmlns:p="http://schemas.openxmlformats.org/presentationml/2006/main">
+  <p:cSld>
+    <p:spTree>
+      <p:nvGrpSpPr>
+        <p:cNvPr id="1" name=""/>
+        <p:cNvGrpSpPr/>
+        <p:nvPr/>
+      </p:nvGrpSpPr>
+      <p:grpSpPr>
+        <a:xfrm>
+          <a:off x="0" y="0"/>
+          <a:ext cx="0" cy="0"/>
+          <a:chOff x="0" y="0"/>
+          <a:chExt cx="0" cy="0"/>
+        </a:xfrm>
+      </p:grpSpPr>
+      <p:sp>
+        <p:nvSpPr>
+          <p:cNvPr id="2" name="Title 1">
+            <a:extLst>
+              <a:ext uri="{FF2B5EF4-FFF2-40B4-BE49-F238E27FC236}">
+                <a16:creationId xmlns:a16="http://schemas.microsoft.com/office/drawing/2014/main" id="{A58D5FEC-8198-47BD-1A78-A5F2CC1218AC}"/>
+              </a:ext>
+            </a:extLst>
+          </p:cNvPr>
+          <p:cNvSpPr>
+            <a:spLocks noGrp="1"/>
+          </p:cNvSpPr>
+          <p:nvPr>
+            <p:ph type="title"/>
+          </p:nvPr>
+        </p:nvSpPr>
+        <p:spPr/>
+        <p:txBody>
+          <a:bodyPr/>
+          <a:lstStyle/>
+          <a:p>
+            <a:endParaRPr lang="en-AU"/>
+          </a:p>
+        </p:txBody>
+      </p:sp>
+      <p:sp>
+        <p:nvSpPr>
+          <p:cNvPr id="3" name="Content Placeholder 2">
+            <a:extLst>
+              <a:ext uri="{FF2B5EF4-FFF2-40B4-BE49-F238E27FC236}">
+                <a16:creationId xmlns:a16="http://schemas.microsoft.com/office/drawing/2014/main" id="{F3D2B5C9-4C68-96CF-3C05-9635BE293B61}"/>
+              </a:ext>
+            </a:extLst>
+          </p:cNvPr>
+          <p:cNvSpPr>
+            <a:spLocks noGrp="1"/>
+          </p:cNvSpPr>
+          <p:nvPr>
+            <p:ph idx="1"/>
+          </p:nvPr>
+        </p:nvSpPr>
+        <p:spPr/>
+        <p:txBody>
+          <a:bodyPr/>
+          <a:lstStyle/>
+          <a:p>
+            <a:endParaRPr lang="en-AU"/>
+          </a:p>
+        </p:txBody>
+      </p:sp>
+      <p:pic>
+        <p:nvPicPr>
+          <p:cNvPr id="5" name="Picture 4">
+            <a:extLst>
+              <a:ext uri="{FF2B5EF4-FFF2-40B4-BE49-F238E27FC236}">
+                <a16:creationId xmlns:a16="http://schemas.microsoft.com/office/drawing/2014/main" id="{47EF845B-0B2E-9BF8-F59E-2BBE8AAF5F58}"/>
+              </a:ext>
+            </a:extLst>
+          </p:cNvPr>
+          <p:cNvPicPr>
+            <a:picLocks noChangeAspect="1"/>
+          </p:cNvPicPr>
+          <p:nvPr/>
+        </p:nvPicPr>
+        <p:blipFill>
+          <a:blip r:embed="rId2"/>
+          <a:stretch>
+            <a:fillRect/>
+          </a:stretch>
+        </p:blipFill>
+        <p:spPr>
+          <a:xfrm>
+            <a:off x="0" y="320007"/>
+            <a:ext cx="12192000" cy="6217986"/>
+          </a:xfrm>
+          <a:prstGeom prst="rect">
+            <a:avLst/>
+          </a:prstGeom>
+        </p:spPr>
+      </p:pic>
+      <p:sp>
+        <p:nvSpPr>
+          <p:cNvPr id="6" name="Rectangle 5">
+            <a:extLst>
+              <a:ext uri="{FF2B5EF4-FFF2-40B4-BE49-F238E27FC236}">
+                <a16:creationId xmlns:a16="http://schemas.microsoft.com/office/drawing/2014/main" id="{AF735642-65F9-AEA9-4DF6-5E73C5AFBE2E}"/>
+              </a:ext>
+            </a:extLst>
+          </p:cNvPr>
+          <p:cNvSpPr/>
+          <p:nvPr/>
+        </p:nvSpPr>
+        <p:spPr>
+          <a:xfrm>
+            <a:off x="1432249" y="2077665"/>
+            <a:ext cx="4245429" cy="2146041"/>
+          </a:xfrm>
+          <a:prstGeom prst="rect">
+            <a:avLst/>
+          </a:prstGeom>
+        </p:spPr>
+        <p:style>
+          <a:lnRef idx="2">
+            <a:schemeClr val="accent1">
+              <a:shade val="15000"/>
+            </a:schemeClr>
+          </a:lnRef>
+          <a:fillRef idx="1">
+            <a:schemeClr val="accent1"/>
+          </a:fillRef>
+          <a:effectRef idx="0">
+            <a:schemeClr val="accent1"/>
+          </a:effectRef>
+          <a:fontRef idx="minor">
+            <a:schemeClr val="lt1"/>
+          </a:fontRef>
+        </p:style>
+        <p:txBody>
+          <a:bodyPr rtlCol="0" anchor="ctr"/>
+          <a:lstStyle/>
+          <a:p>
+            <a:pPr algn="ctr"/>
+            <a:endParaRPr lang="en-AU"/>
+          </a:p>
+        </p:txBody>
+      </p:sp>
+      <p:sp>
+        <p:nvSpPr>
+          <p:cNvPr id="7" name="Rectangle 6">
+            <a:extLst>
+              <a:ext uri="{FF2B5EF4-FFF2-40B4-BE49-F238E27FC236}">
+                <a16:creationId xmlns:a16="http://schemas.microsoft.com/office/drawing/2014/main" id="{BA9D7697-B25C-A732-069A-763F690DB237}"/>
+              </a:ext>
+            </a:extLst>
+          </p:cNvPr>
+          <p:cNvSpPr/>
+          <p:nvPr/>
+        </p:nvSpPr>
+        <p:spPr>
+          <a:xfrm>
+            <a:off x="5968482" y="2077665"/>
+            <a:ext cx="4245429" cy="2146041"/>
+          </a:xfrm>
+          <a:prstGeom prst="rect">
+            <a:avLst/>
+          </a:prstGeom>
+        </p:spPr>
+        <p:style>
+          <a:lnRef idx="2">
+            <a:schemeClr val="accent1">
+              <a:shade val="15000"/>
+            </a:schemeClr>
+          </a:lnRef>
+          <a:fillRef idx="1">
+            <a:schemeClr val="accent1"/>
+          </a:fillRef>
+          <a:effectRef idx="0">
+            <a:schemeClr val="accent1"/>
+          </a:effectRef>
+          <a:fontRef idx="minor">
+            <a:schemeClr val="lt1"/>
+          </a:fontRef>
+        </p:style>
+        <p:txBody>
+          <a:bodyPr rtlCol="0" anchor="ctr"/>
+          <a:lstStyle/>
+          <a:p>
+            <a:pPr algn="ctr"/>
+            <a:endParaRPr lang="en-AU"/>
+          </a:p>
+        </p:txBody>
+      </p:sp>
+      <p:sp>
+        <p:nvSpPr>
+          <p:cNvPr id="8" name="TextBox 7">
+            <a:extLst>
+              <a:ext uri="{FF2B5EF4-FFF2-40B4-BE49-F238E27FC236}">
+                <a16:creationId xmlns:a16="http://schemas.microsoft.com/office/drawing/2014/main" id="{F5B6BA4E-BAB6-F814-2755-691B0D7AF23B}"/>
+              </a:ext>
+            </a:extLst>
+          </p:cNvPr>
+          <p:cNvSpPr txBox="1"/>
+          <p:nvPr/>
+        </p:nvSpPr>
+        <p:spPr>
+          <a:xfrm>
+            <a:off x="2281336" y="2751615"/>
+            <a:ext cx="2547257" cy="369332"/>
+          </a:xfrm>
+          <a:prstGeom prst="rect">
+            <a:avLst/>
+          </a:prstGeom>
+          <a:noFill/>
+        </p:spPr>
+        <p:txBody>
+          <a:bodyPr wrap="square" rtlCol="0">
+            <a:spAutoFit/>
+          </a:bodyPr>
+          <a:lstStyle/>
+          <a:p>
+            <a:r>
+              <a:rPr lang="en-AU" dirty="0"/>
+              <a:t>yes  </a:t>
+            </a:r>
+          </a:p>
+        </p:txBody>
+      </p:sp>
+      <p:sp>
+        <p:nvSpPr>
+          <p:cNvPr id="9" name="TextBox 8">
+            <a:extLst>
+              <a:ext uri="{FF2B5EF4-FFF2-40B4-BE49-F238E27FC236}">
+                <a16:creationId xmlns:a16="http://schemas.microsoft.com/office/drawing/2014/main" id="{65BBE36C-7296-225B-6743-81AD2B6870A7}"/>
+              </a:ext>
+            </a:extLst>
+          </p:cNvPr>
+          <p:cNvSpPr txBox="1"/>
+          <p:nvPr/>
+        </p:nvSpPr>
+        <p:spPr>
+          <a:xfrm>
+            <a:off x="6652727" y="2784463"/>
+            <a:ext cx="2547257" cy="369332"/>
+          </a:xfrm>
+          <a:prstGeom prst="rect">
+            <a:avLst/>
+          </a:prstGeom>
+          <a:noFill/>
+        </p:spPr>
+        <p:txBody>
+          <a:bodyPr wrap="square" rtlCol="0">
+            <a:spAutoFit/>
+          </a:bodyPr>
+          <a:lstStyle/>
+          <a:p>
+            <a:r>
+              <a:rPr lang="en-AU" dirty="0"/>
+              <a:t>no </a:t>
+            </a:r>
+          </a:p>
+        </p:txBody>
+      </p:sp>
+      <p:sp>
+        <p:nvSpPr>
+          <p:cNvPr id="4" name="TextBox 3">
+            <a:extLst>
+              <a:ext uri="{FF2B5EF4-FFF2-40B4-BE49-F238E27FC236}">
+                <a16:creationId xmlns:a16="http://schemas.microsoft.com/office/drawing/2014/main" id="{A4543A73-2EF8-EBB6-0F5E-60695FBF6F63}"/>
+              </a:ext>
+            </a:extLst>
+          </p:cNvPr>
+          <p:cNvSpPr txBox="1"/>
+          <p:nvPr/>
+        </p:nvSpPr>
+        <p:spPr>
+          <a:xfrm>
+            <a:off x="3357465" y="1388825"/>
+            <a:ext cx="5477069" cy="369332"/>
+          </a:xfrm>
+          <a:prstGeom prst="rect">
+            <a:avLst/>
+          </a:prstGeom>
+          <a:solidFill>
+            <a:schemeClr val="bg1"/>
+          </a:solidFill>
+        </p:spPr>
+        <p:txBody>
+          <a:bodyPr wrap="square" rtlCol="0">
+            <a:spAutoFit/>
+          </a:bodyPr>
+          <a:lstStyle/>
+          <a:p>
+            <a:r>
+              <a:rPr lang="en-AU" dirty="0"/>
+              <a:t>Do you appreciate an aftertaste? </a:t>
+            </a:r>
+          </a:p>
+        </p:txBody>
+      </p:sp>
+    </p:spTree>
+    <p:extLst>
+      <p:ext uri="{BB962C8B-B14F-4D97-AF65-F5344CB8AC3E}">
+        <p14:creationId xmlns:p14="http://schemas.microsoft.com/office/powerpoint/2010/main" val="3934052413"/>
+      </p:ext>
+    </p:extLst>
+  </p:cSld>
+  <p:clrMapOvr>
+    <a:masterClrMapping/>
+  </p:clrMapOvr>
+</p:sld>
+</file>
+
+<file path=ppt/slides/slide7.xml><?xml version="1.0" encoding="utf-8"?>
+<p:sld xmlns:a="http://schemas.openxmlformats.org/drawingml/2006/main" xmlns:r="http://schemas.openxmlformats.org/officeDocument/2006/relationships" xmlns:p="http://schemas.openxmlformats.org/presentationml/2006/main">
+  <p:cSld>
+    <p:spTree>
+      <p:nvGrpSpPr>
+        <p:cNvPr id="1" name=""/>
+        <p:cNvGrpSpPr/>
+        <p:nvPr/>
+      </p:nvGrpSpPr>
+      <p:grpSpPr>
+        <a:xfrm>
+          <a:off x="0" y="0"/>
+          <a:ext cx="0" cy="0"/>
+          <a:chOff x="0" y="0"/>
+          <a:chExt cx="0" cy="0"/>
+        </a:xfrm>
+      </p:grpSpPr>
+      <p:sp>
+        <p:nvSpPr>
+          <p:cNvPr id="2" name="Title 1">
+            <a:extLst>
+              <a:ext uri="{FF2B5EF4-FFF2-40B4-BE49-F238E27FC236}">
+                <a16:creationId xmlns:a16="http://schemas.microsoft.com/office/drawing/2014/main" id="{A58D5FEC-8198-47BD-1A78-A5F2CC1218AC}"/>
+              </a:ext>
+            </a:extLst>
+          </p:cNvPr>
+          <p:cNvSpPr>
+            <a:spLocks noGrp="1"/>
+          </p:cNvSpPr>
+          <p:nvPr>
+            <p:ph type="title"/>
+          </p:nvPr>
+        </p:nvSpPr>
+        <p:spPr/>
+        <p:txBody>
+          <a:bodyPr/>
+          <a:lstStyle/>
+          <a:p>
+            <a:endParaRPr lang="en-AU"/>
+          </a:p>
+        </p:txBody>
+      </p:sp>
+      <p:sp>
+        <p:nvSpPr>
+          <p:cNvPr id="3" name="Content Placeholder 2">
+            <a:extLst>
+              <a:ext uri="{FF2B5EF4-FFF2-40B4-BE49-F238E27FC236}">
+                <a16:creationId xmlns:a16="http://schemas.microsoft.com/office/drawing/2014/main" id="{F3D2B5C9-4C68-96CF-3C05-9635BE293B61}"/>
+              </a:ext>
+            </a:extLst>
+          </p:cNvPr>
+          <p:cNvSpPr>
+            <a:spLocks noGrp="1"/>
+          </p:cNvSpPr>
+          <p:nvPr>
+            <p:ph idx="1"/>
+          </p:nvPr>
+        </p:nvSpPr>
+        <p:spPr/>
+        <p:txBody>
+          <a:bodyPr/>
+          <a:lstStyle/>
+          <a:p>
+            <a:endParaRPr lang="en-AU"/>
+          </a:p>
+        </p:txBody>
+      </p:sp>
+      <p:pic>
+        <p:nvPicPr>
+          <p:cNvPr id="5" name="Picture 4">
+            <a:extLst>
+              <a:ext uri="{FF2B5EF4-FFF2-40B4-BE49-F238E27FC236}">
+                <a16:creationId xmlns:a16="http://schemas.microsoft.com/office/drawing/2014/main" id="{47EF845B-0B2E-9BF8-F59E-2BBE8AAF5F58}"/>
+              </a:ext>
+            </a:extLst>
+          </p:cNvPr>
+          <p:cNvPicPr>
+            <a:picLocks noChangeAspect="1"/>
+          </p:cNvPicPr>
+          <p:nvPr/>
+        </p:nvPicPr>
+        <p:blipFill>
+          <a:blip r:embed="rId2"/>
+          <a:stretch>
+            <a:fillRect/>
+          </a:stretch>
+        </p:blipFill>
+        <p:spPr>
+          <a:xfrm>
+            <a:off x="0" y="320007"/>
+            <a:ext cx="12192000" cy="6217986"/>
+          </a:xfrm>
+          <a:prstGeom prst="rect">
+            <a:avLst/>
+          </a:prstGeom>
+        </p:spPr>
+      </p:pic>
+      <p:sp>
+        <p:nvSpPr>
+          <p:cNvPr id="6" name="Rectangle 5">
+            <a:extLst>
+              <a:ext uri="{FF2B5EF4-FFF2-40B4-BE49-F238E27FC236}">
+                <a16:creationId xmlns:a16="http://schemas.microsoft.com/office/drawing/2014/main" id="{AF735642-65F9-AEA9-4DF6-5E73C5AFBE2E}"/>
+              </a:ext>
+            </a:extLst>
+          </p:cNvPr>
+          <p:cNvSpPr/>
+          <p:nvPr/>
+        </p:nvSpPr>
+        <p:spPr>
+          <a:xfrm>
+            <a:off x="1432249" y="2077665"/>
+            <a:ext cx="4245429" cy="2146041"/>
+          </a:xfrm>
+          <a:prstGeom prst="rect">
+            <a:avLst/>
+          </a:prstGeom>
+        </p:spPr>
+        <p:style>
+          <a:lnRef idx="2">
+            <a:schemeClr val="accent1">
+              <a:shade val="15000"/>
+            </a:schemeClr>
+          </a:lnRef>
+          <a:fillRef idx="1">
+            <a:schemeClr val="accent1"/>
+          </a:fillRef>
+          <a:effectRef idx="0">
+            <a:schemeClr val="accent1"/>
+          </a:effectRef>
+          <a:fontRef idx="minor">
+            <a:schemeClr val="lt1"/>
+          </a:fontRef>
+        </p:style>
+        <p:txBody>
+          <a:bodyPr rtlCol="0" anchor="ctr"/>
+          <a:lstStyle/>
+          <a:p>
+            <a:pPr algn="ctr"/>
+            <a:endParaRPr lang="en-AU"/>
+          </a:p>
+        </p:txBody>
+      </p:sp>
+      <p:sp>
+        <p:nvSpPr>
+          <p:cNvPr id="7" name="Rectangle 6">
+            <a:extLst>
+              <a:ext uri="{FF2B5EF4-FFF2-40B4-BE49-F238E27FC236}">
+                <a16:creationId xmlns:a16="http://schemas.microsoft.com/office/drawing/2014/main" id="{BA9D7697-B25C-A732-069A-763F690DB237}"/>
+              </a:ext>
+            </a:extLst>
+          </p:cNvPr>
+          <p:cNvSpPr/>
+          <p:nvPr/>
+        </p:nvSpPr>
+        <p:spPr>
+          <a:xfrm>
+            <a:off x="5968482" y="2077665"/>
+            <a:ext cx="4245429" cy="2146041"/>
+          </a:xfrm>
+          <a:prstGeom prst="rect">
+            <a:avLst/>
+          </a:prstGeom>
+        </p:spPr>
+        <p:style>
+          <a:lnRef idx="2">
+            <a:schemeClr val="accent1">
+              <a:shade val="15000"/>
+            </a:schemeClr>
+          </a:lnRef>
+          <a:fillRef idx="1">
+            <a:schemeClr val="accent1"/>
+          </a:fillRef>
+          <a:effectRef idx="0">
+            <a:schemeClr val="accent1"/>
+          </a:effectRef>
+          <a:fontRef idx="minor">
+            <a:schemeClr val="lt1"/>
+          </a:fontRef>
+        </p:style>
+        <p:txBody>
+          <a:bodyPr rtlCol="0" anchor="ctr"/>
+          <a:lstStyle/>
+          <a:p>
+            <a:pPr algn="ctr"/>
+            <a:endParaRPr lang="en-AU"/>
+          </a:p>
+        </p:txBody>
+      </p:sp>
+      <p:sp>
+        <p:nvSpPr>
+          <p:cNvPr id="8" name="TextBox 7">
+            <a:extLst>
+              <a:ext uri="{FF2B5EF4-FFF2-40B4-BE49-F238E27FC236}">
+                <a16:creationId xmlns:a16="http://schemas.microsoft.com/office/drawing/2014/main" id="{F5B6BA4E-BAB6-F814-2755-691B0D7AF23B}"/>
+              </a:ext>
+            </a:extLst>
+          </p:cNvPr>
+          <p:cNvSpPr txBox="1"/>
+          <p:nvPr/>
+        </p:nvSpPr>
+        <p:spPr>
+          <a:xfrm>
+            <a:off x="2281336" y="2751615"/>
+            <a:ext cx="2547257" cy="369332"/>
+          </a:xfrm>
+          <a:prstGeom prst="rect">
+            <a:avLst/>
+          </a:prstGeom>
+          <a:noFill/>
+        </p:spPr>
+        <p:txBody>
+          <a:bodyPr wrap="square" rtlCol="0">
+            <a:spAutoFit/>
+          </a:bodyPr>
+          <a:lstStyle/>
+          <a:p>
+            <a:r>
+              <a:rPr lang="en-AU" dirty="0"/>
+              <a:t>&lt;2 tsp  </a:t>
+            </a:r>
+          </a:p>
+        </p:txBody>
+      </p:sp>
+      <p:sp>
+        <p:nvSpPr>
+          <p:cNvPr id="9" name="TextBox 8">
+            <a:extLst>
+              <a:ext uri="{FF2B5EF4-FFF2-40B4-BE49-F238E27FC236}">
+                <a16:creationId xmlns:a16="http://schemas.microsoft.com/office/drawing/2014/main" id="{65BBE36C-7296-225B-6743-81AD2B6870A7}"/>
+              </a:ext>
+            </a:extLst>
+          </p:cNvPr>
+          <p:cNvSpPr txBox="1"/>
+          <p:nvPr/>
+        </p:nvSpPr>
+        <p:spPr>
+          <a:xfrm>
+            <a:off x="6652727" y="2784463"/>
+            <a:ext cx="2547257" cy="369332"/>
+          </a:xfrm>
+          <a:prstGeom prst="rect">
+            <a:avLst/>
+          </a:prstGeom>
+          <a:noFill/>
+        </p:spPr>
+        <p:txBody>
+          <a:bodyPr wrap="square" rtlCol="0">
+            <a:spAutoFit/>
+          </a:bodyPr>
+          <a:lstStyle/>
+          <a:p>
+            <a:r>
+              <a:rPr lang="en-AU" dirty="0"/>
+              <a:t>&gt; 2tsp   </a:t>
+            </a:r>
+          </a:p>
+        </p:txBody>
+      </p:sp>
+      <p:sp>
+        <p:nvSpPr>
+          <p:cNvPr id="4" name="TextBox 3">
+            <a:extLst>
+              <a:ext uri="{FF2B5EF4-FFF2-40B4-BE49-F238E27FC236}">
+                <a16:creationId xmlns:a16="http://schemas.microsoft.com/office/drawing/2014/main" id="{A4543A73-2EF8-EBB6-0F5E-60695FBF6F63}"/>
+              </a:ext>
+            </a:extLst>
+          </p:cNvPr>
+          <p:cNvSpPr txBox="1"/>
+          <p:nvPr/>
+        </p:nvSpPr>
+        <p:spPr>
+          <a:xfrm>
+            <a:off x="3357465" y="1388825"/>
+            <a:ext cx="5477069" cy="369332"/>
+          </a:xfrm>
+          <a:prstGeom prst="rect">
+            <a:avLst/>
+          </a:prstGeom>
+          <a:solidFill>
+            <a:schemeClr val="bg1"/>
+          </a:solidFill>
+        </p:spPr>
+        <p:txBody>
+          <a:bodyPr wrap="square" rtlCol="0">
+            <a:spAutoFit/>
+          </a:bodyPr>
+          <a:lstStyle/>
+          <a:p>
+            <a:r>
+              <a:rPr lang="en-AU" dirty="0"/>
+              <a:t>How many sugars do you add to your coffee? </a:t>
+            </a:r>
+          </a:p>
+        </p:txBody>
+      </p:sp>
+    </p:spTree>
+    <p:extLst>
+      <p:ext uri="{BB962C8B-B14F-4D97-AF65-F5344CB8AC3E}">
+        <p14:creationId xmlns:p14="http://schemas.microsoft.com/office/powerpoint/2010/main" val="2083615937"/>
+      </p:ext>
+    </p:extLst>
+  </p:cSld>
+  <p:clrMapOvr>
+    <a:masterClrMapping/>
+  </p:clrMapOvr>
+</p:sld>
+</file>
+
+<file path=ppt/slides/slide8.xml><?xml version="1.0" encoding="utf-8"?>
+<p:sld xmlns:a="http://schemas.openxmlformats.org/drawingml/2006/main" xmlns:r="http://schemas.openxmlformats.org/officeDocument/2006/relationships" xmlns:p="http://schemas.openxmlformats.org/presentationml/2006/main">
+  <p:cSld>
+    <p:spTree>
+      <p:nvGrpSpPr>
+        <p:cNvPr id="1" name=""/>
+        <p:cNvGrpSpPr/>
+        <p:nvPr/>
+      </p:nvGrpSpPr>
+      <p:grpSpPr>
+        <a:xfrm>
+          <a:off x="0" y="0"/>
+          <a:ext cx="0" cy="0"/>
+          <a:chOff x="0" y="0"/>
+          <a:chExt cx="0" cy="0"/>
+        </a:xfrm>
+      </p:grpSpPr>
+      <p:sp>
+        <p:nvSpPr>
+          <p:cNvPr id="2" name="Title 1">
+            <a:extLst>
+              <a:ext uri="{FF2B5EF4-FFF2-40B4-BE49-F238E27FC236}">
+                <a16:creationId xmlns:a16="http://schemas.microsoft.com/office/drawing/2014/main" id="{A58D5FEC-8198-47BD-1A78-A5F2CC1218AC}"/>
+              </a:ext>
+            </a:extLst>
+          </p:cNvPr>
+          <p:cNvSpPr>
+            <a:spLocks noGrp="1"/>
+          </p:cNvSpPr>
+          <p:nvPr>
+            <p:ph type="title"/>
+          </p:nvPr>
+        </p:nvSpPr>
+        <p:spPr/>
+        <p:txBody>
+          <a:bodyPr/>
+          <a:lstStyle/>
+          <a:p>
+            <a:endParaRPr lang="en-AU"/>
+          </a:p>
+        </p:txBody>
+      </p:sp>
+      <p:sp>
+        <p:nvSpPr>
+          <p:cNvPr id="3" name="Content Placeholder 2">
+            <a:extLst>
+              <a:ext uri="{FF2B5EF4-FFF2-40B4-BE49-F238E27FC236}">
+                <a16:creationId xmlns:a16="http://schemas.microsoft.com/office/drawing/2014/main" id="{F3D2B5C9-4C68-96CF-3C05-9635BE293B61}"/>
+              </a:ext>
+            </a:extLst>
+          </p:cNvPr>
+          <p:cNvSpPr>
+            <a:spLocks noGrp="1"/>
+          </p:cNvSpPr>
+          <p:nvPr>
+            <p:ph idx="1"/>
+          </p:nvPr>
+        </p:nvSpPr>
+        <p:spPr/>
+        <p:txBody>
+          <a:bodyPr/>
+          <a:lstStyle/>
+          <a:p>
+            <a:endParaRPr lang="en-AU"/>
+          </a:p>
+        </p:txBody>
+      </p:sp>
+      <p:pic>
+        <p:nvPicPr>
+          <p:cNvPr id="5" name="Picture 4">
+            <a:extLst>
+              <a:ext uri="{FF2B5EF4-FFF2-40B4-BE49-F238E27FC236}">
+                <a16:creationId xmlns:a16="http://schemas.microsoft.com/office/drawing/2014/main" id="{47EF845B-0B2E-9BF8-F59E-2BBE8AAF5F58}"/>
+              </a:ext>
+            </a:extLst>
+          </p:cNvPr>
+          <p:cNvPicPr>
+            <a:picLocks noChangeAspect="1"/>
+          </p:cNvPicPr>
+          <p:nvPr/>
+        </p:nvPicPr>
+        <p:blipFill>
+          <a:blip r:embed="rId2"/>
+          <a:stretch>
+            <a:fillRect/>
+          </a:stretch>
+        </p:blipFill>
+        <p:spPr>
+          <a:xfrm>
+            <a:off x="0" y="320007"/>
+            <a:ext cx="12192000" cy="6217986"/>
+          </a:xfrm>
+          <a:prstGeom prst="rect">
+            <a:avLst/>
+          </a:prstGeom>
+        </p:spPr>
+      </p:pic>
+      <p:sp>
+        <p:nvSpPr>
+          <p:cNvPr id="7" name="Rectangle 6">
+            <a:extLst>
+              <a:ext uri="{FF2B5EF4-FFF2-40B4-BE49-F238E27FC236}">
+                <a16:creationId xmlns:a16="http://schemas.microsoft.com/office/drawing/2014/main" id="{BA9D7697-B25C-A732-069A-763F690DB237}"/>
+              </a:ext>
+            </a:extLst>
+          </p:cNvPr>
+          <p:cNvSpPr/>
+          <p:nvPr/>
+        </p:nvSpPr>
+        <p:spPr>
+          <a:xfrm>
+            <a:off x="3803780" y="1896108"/>
+            <a:ext cx="5778759" cy="4075484"/>
+          </a:xfrm>
+          <a:prstGeom prst="rect">
+            <a:avLst/>
+          </a:prstGeom>
+        </p:spPr>
+        <p:style>
+          <a:lnRef idx="2">
+            <a:schemeClr val="accent1">
+              <a:shade val="15000"/>
+            </a:schemeClr>
+          </a:lnRef>
+          <a:fillRef idx="1">
+            <a:schemeClr val="accent1"/>
+          </a:fillRef>
+          <a:effectRef idx="0">
+            <a:schemeClr val="accent1"/>
+          </a:effectRef>
+          <a:fontRef idx="minor">
+            <a:schemeClr val="lt1"/>
+          </a:fontRef>
+        </p:style>
+        <p:txBody>
+          <a:bodyPr rtlCol="0" anchor="ctr"/>
+          <a:lstStyle/>
+          <a:p>
+            <a:pPr algn="ctr"/>
+            <a:endParaRPr lang="en-AU"/>
+          </a:p>
+        </p:txBody>
+      </p:sp>
+      <p:sp>
+        <p:nvSpPr>
+          <p:cNvPr id="9" name="TextBox 8">
+            <a:extLst>
+              <a:ext uri="{FF2B5EF4-FFF2-40B4-BE49-F238E27FC236}">
+                <a16:creationId xmlns:a16="http://schemas.microsoft.com/office/drawing/2014/main" id="{65BBE36C-7296-225B-6743-81AD2B6870A7}"/>
+              </a:ext>
+            </a:extLst>
+          </p:cNvPr>
+          <p:cNvSpPr txBox="1"/>
+          <p:nvPr/>
+        </p:nvSpPr>
+        <p:spPr>
+          <a:xfrm>
+            <a:off x="4544008" y="2261949"/>
+            <a:ext cx="2547257" cy="923330"/>
+          </a:xfrm>
+          <a:prstGeom prst="rect">
+            <a:avLst/>
+          </a:prstGeom>
+          <a:noFill/>
+        </p:spPr>
+        <p:txBody>
+          <a:bodyPr wrap="square" rtlCol="0">
+            <a:spAutoFit/>
+          </a:bodyPr>
+          <a:lstStyle/>
+          <a:p>
+            <a:r>
+              <a:rPr lang="en-AU" dirty="0"/>
+              <a:t>Lists and information maybe a hover over? or add info. </a:t>
+            </a:r>
+          </a:p>
+        </p:txBody>
+      </p:sp>
+      <p:sp>
+        <p:nvSpPr>
+          <p:cNvPr id="4" name="TextBox 3">
+            <a:extLst>
+              <a:ext uri="{FF2B5EF4-FFF2-40B4-BE49-F238E27FC236}">
+                <a16:creationId xmlns:a16="http://schemas.microsoft.com/office/drawing/2014/main" id="{A4543A73-2EF8-EBB6-0F5E-60695FBF6F63}"/>
+              </a:ext>
+            </a:extLst>
+          </p:cNvPr>
+          <p:cNvSpPr txBox="1"/>
+          <p:nvPr/>
+        </p:nvSpPr>
+        <p:spPr>
+          <a:xfrm>
+            <a:off x="3357465" y="1388825"/>
+            <a:ext cx="5477069" cy="369332"/>
+          </a:xfrm>
+          <a:prstGeom prst="rect">
+            <a:avLst/>
+          </a:prstGeom>
+          <a:solidFill>
+            <a:schemeClr val="bg1"/>
+          </a:solidFill>
+        </p:spPr>
+        <p:txBody>
+          <a:bodyPr wrap="square" rtlCol="0">
+            <a:spAutoFit/>
+          </a:bodyPr>
+          <a:lstStyle/>
+          <a:p>
+            <a:r>
+              <a:rPr lang="en-AU" dirty="0"/>
+              <a:t>Here is your recommended Coffee  </a:t>
+            </a:r>
+          </a:p>
+        </p:txBody>
+      </p:sp>
+    </p:spTree>
+    <p:extLst>
+      <p:ext uri="{BB962C8B-B14F-4D97-AF65-F5344CB8AC3E}">
+        <p14:creationId xmlns:p14="http://schemas.microsoft.com/office/powerpoint/2010/main" val="964217785"/>
+      </p:ext>
+    </p:extLst>
+  </p:cSld>
+  <p:clrMapOvr>
+    <a:masterClrMapping/>
+  </p:clrMapOvr>
+</p:sld>
+</file>
+
+<file path=ppt/slides/slide9.xml><?xml version="1.0" encoding="utf-8"?>
+<p:sld xmlns:a="http://schemas.openxmlformats.org/drawingml/2006/main" xmlns:r="http://schemas.openxmlformats.org/officeDocument/2006/relationships" xmlns:p="http://schemas.openxmlformats.org/presentationml/2006/main">
+  <p:cSld>
+    <p:spTree>
+      <p:nvGrpSpPr>
+        <p:cNvPr id="1" name=""/>
+        <p:cNvGrpSpPr/>
+        <p:nvPr/>
+      </p:nvGrpSpPr>
+      <p:grpSpPr>
+        <a:xfrm>
+          <a:off x="0" y="0"/>
+          <a:ext cx="0" cy="0"/>
+          <a:chOff x="0" y="0"/>
+          <a:chExt cx="0" cy="0"/>
+        </a:xfrm>
+      </p:grpSpPr>
+      <p:sp>
+        <p:nvSpPr>
+          <p:cNvPr id="14" name="Rectangle 13">
+            <a:extLst>
+              <a:ext uri="{FF2B5EF4-FFF2-40B4-BE49-F238E27FC236}">
+                <a16:creationId xmlns:a16="http://schemas.microsoft.com/office/drawing/2014/main" id="{F0C84AA1-4E51-1C02-B5ED-6EFF4307982C}"/>
+              </a:ext>
+            </a:extLst>
+          </p:cNvPr>
+          <p:cNvSpPr/>
+          <p:nvPr/>
+        </p:nvSpPr>
+        <p:spPr>
+          <a:xfrm>
+            <a:off x="8595048" y="2200026"/>
+            <a:ext cx="2245567" cy="1266245"/>
+          </a:xfrm>
+          <a:prstGeom prst="rect">
+            <a:avLst/>
+          </a:prstGeom>
+        </p:spPr>
+        <p:style>
+          <a:lnRef idx="2">
+            <a:schemeClr val="accent1">
+              <a:shade val="15000"/>
+            </a:schemeClr>
+          </a:lnRef>
+          <a:fillRef idx="1">
+            <a:schemeClr val="accent1"/>
+          </a:fillRef>
+          <a:effectRef idx="0">
+            <a:schemeClr val="accent1"/>
+          </a:effectRef>
+          <a:fontRef idx="minor">
+            <a:schemeClr val="lt1"/>
+          </a:fontRef>
+        </p:style>
+        <p:txBody>
+          <a:bodyPr rtlCol="0" anchor="ctr"/>
+          <a:lstStyle/>
+          <a:p>
+            <a:pPr algn="ctr"/>
+            <a:endParaRPr lang="en-AU" dirty="0"/>
+          </a:p>
+        </p:txBody>
+      </p:sp>
+      <p:sp>
+        <p:nvSpPr>
+          <p:cNvPr id="15" name="Rectangle 14">
+            <a:extLst>
+              <a:ext uri="{FF2B5EF4-FFF2-40B4-BE49-F238E27FC236}">
+                <a16:creationId xmlns:a16="http://schemas.microsoft.com/office/drawing/2014/main" id="{8925BE1A-F598-5917-FC0B-AFB0CA314825}"/>
+              </a:ext>
+            </a:extLst>
+          </p:cNvPr>
+          <p:cNvSpPr/>
+          <p:nvPr/>
+        </p:nvSpPr>
+        <p:spPr>
+          <a:xfrm>
+            <a:off x="8595048" y="3647243"/>
+            <a:ext cx="2245567" cy="1266245"/>
+          </a:xfrm>
+          <a:prstGeom prst="rect">
+            <a:avLst/>
+          </a:prstGeom>
+        </p:spPr>
+        <p:style>
+          <a:lnRef idx="2">
+            <a:schemeClr val="accent1">
+              <a:shade val="15000"/>
+            </a:schemeClr>
+          </a:lnRef>
+          <a:fillRef idx="1">
+            <a:schemeClr val="accent1"/>
+          </a:fillRef>
+          <a:effectRef idx="0">
+            <a:schemeClr val="accent1"/>
+          </a:effectRef>
+          <a:fontRef idx="minor">
+            <a:schemeClr val="lt1"/>
+          </a:fontRef>
+        </p:style>
+        <p:txBody>
+          <a:bodyPr rtlCol="0" anchor="ctr"/>
+          <a:lstStyle/>
+          <a:p>
+            <a:pPr algn="ctr"/>
+            <a:endParaRPr lang="en-AU"/>
+          </a:p>
+        </p:txBody>
+      </p:sp>
+      <p:sp>
+        <p:nvSpPr>
+          <p:cNvPr id="16" name="Rectangle 15">
+            <a:extLst>
+              <a:ext uri="{FF2B5EF4-FFF2-40B4-BE49-F238E27FC236}">
+                <a16:creationId xmlns:a16="http://schemas.microsoft.com/office/drawing/2014/main" id="{F3B291E6-DDD7-E631-D28D-A1DEA79F5939}"/>
+              </a:ext>
+            </a:extLst>
+          </p:cNvPr>
+          <p:cNvSpPr/>
+          <p:nvPr/>
+        </p:nvSpPr>
+        <p:spPr>
+          <a:xfrm>
+            <a:off x="8595048" y="4982646"/>
+            <a:ext cx="2245567" cy="1266245"/>
+          </a:xfrm>
+          <a:prstGeom prst="rect">
+            <a:avLst/>
+          </a:prstGeom>
+        </p:spPr>
+        <p:style>
+          <a:lnRef idx="2">
+            <a:schemeClr val="accent1">
+              <a:shade val="15000"/>
+            </a:schemeClr>
+          </a:lnRef>
+          <a:fillRef idx="1">
+            <a:schemeClr val="accent1"/>
+          </a:fillRef>
+          <a:effectRef idx="0">
+            <a:schemeClr val="accent1"/>
+          </a:effectRef>
+          <a:fontRef idx="minor">
+            <a:schemeClr val="lt1"/>
+          </a:fontRef>
+        </p:style>
+        <p:txBody>
+          <a:bodyPr rtlCol="0" anchor="ctr"/>
+          <a:lstStyle/>
+          <a:p>
+            <a:pPr algn="ctr"/>
+            <a:endParaRPr lang="en-AU" dirty="0"/>
+          </a:p>
+          <a:p>
+            <a:pPr algn="ctr"/>
+            <a:endParaRPr lang="en-AU" dirty="0"/>
+          </a:p>
+          <a:p>
+            <a:pPr algn="ctr"/>
+            <a:endParaRPr lang="en-AU" dirty="0"/>
+          </a:p>
+          <a:p>
+            <a:pPr algn="ctr"/>
+            <a:endParaRPr lang="en-AU" dirty="0"/>
+          </a:p>
+          <a:p>
+            <a:pPr algn="ctr"/>
+            <a:endParaRPr lang="en-AU" dirty="0"/>
+          </a:p>
+          <a:p>
+            <a:pPr algn="ctr"/>
+            <a:endParaRPr lang="en-AU" dirty="0"/>
+          </a:p>
+        </p:txBody>
+      </p:sp>
+      <p:sp>
+        <p:nvSpPr>
+          <p:cNvPr id="7" name="Rectangle 6">
+            <a:extLst>
+              <a:ext uri="{FF2B5EF4-FFF2-40B4-BE49-F238E27FC236}">
+                <a16:creationId xmlns:a16="http://schemas.microsoft.com/office/drawing/2014/main" id="{3C804C17-C235-8AF2-DF0E-C280DC569BC3}"/>
+              </a:ext>
+            </a:extLst>
+          </p:cNvPr>
+          <p:cNvSpPr/>
+          <p:nvPr/>
+        </p:nvSpPr>
+        <p:spPr>
+          <a:xfrm>
+            <a:off x="838200" y="1603018"/>
+            <a:ext cx="4049486" cy="2048069"/>
+          </a:xfrm>
+          <a:prstGeom prst="rect">
+            <a:avLst/>
+          </a:prstGeom>
+        </p:spPr>
+        <p:style>
+          <a:lnRef idx="2">
+            <a:schemeClr val="accent1">
+              <a:shade val="15000"/>
+            </a:schemeClr>
+          </a:lnRef>
+          <a:fillRef idx="1">
+            <a:schemeClr val="accent1"/>
+          </a:fillRef>
+          <a:effectRef idx="0">
+            <a:schemeClr val="accent1"/>
+          </a:effectRef>
+          <a:fontRef idx="minor">
+            <a:schemeClr val="lt1"/>
+          </a:fontRef>
+        </p:style>
+        <p:txBody>
+          <a:bodyPr rtlCol="0" anchor="ctr"/>
+          <a:lstStyle/>
+          <a:p>
+            <a:pPr algn="ctr"/>
+            <a:endParaRPr lang="en-AU"/>
+          </a:p>
+        </p:txBody>
+      </p:sp>
+      <p:sp>
+        <p:nvSpPr>
+          <p:cNvPr id="2" name="Title 1">
+            <a:extLst>
+              <a:ext uri="{FF2B5EF4-FFF2-40B4-BE49-F238E27FC236}">
+                <a16:creationId xmlns:a16="http://schemas.microsoft.com/office/drawing/2014/main" id="{1DAD1FC4-8D98-A495-3C1E-BF685A4F864C}"/>
+              </a:ext>
+            </a:extLst>
+          </p:cNvPr>
+          <p:cNvSpPr>
+            <a:spLocks noGrp="1"/>
+          </p:cNvSpPr>
+          <p:nvPr>
+            <p:ph type="title"/>
+          </p:nvPr>
+        </p:nvSpPr>
+        <p:spPr/>
+        <p:txBody>
+          <a:bodyPr/>
+          <a:lstStyle/>
+          <a:p>
+            <a:r>
+              <a:rPr lang="en-AU" dirty="0"/>
+              <a:t>Dog Layout </a:t>
+            </a:r>
+          </a:p>
+        </p:txBody>
+      </p:sp>
+      <p:sp>
+        <p:nvSpPr>
+          <p:cNvPr id="4" name="TextBox 3">
+            <a:extLst>
+              <a:ext uri="{FF2B5EF4-FFF2-40B4-BE49-F238E27FC236}">
+                <a16:creationId xmlns:a16="http://schemas.microsoft.com/office/drawing/2014/main" id="{832297B6-EF4D-C697-8D1C-12C94490F0F0}"/>
+              </a:ext>
+            </a:extLst>
+          </p:cNvPr>
+          <p:cNvSpPr txBox="1"/>
+          <p:nvPr/>
+        </p:nvSpPr>
+        <p:spPr>
+          <a:xfrm>
+            <a:off x="1213757" y="1978089"/>
+            <a:ext cx="3687147" cy="369332"/>
+          </a:xfrm>
+          <a:prstGeom prst="rect">
+            <a:avLst/>
+          </a:prstGeom>
+          <a:noFill/>
+        </p:spPr>
+        <p:txBody>
+          <a:bodyPr wrap="square" rtlCol="0">
+            <a:spAutoFit/>
+          </a:bodyPr>
+          <a:lstStyle/>
+          <a:p>
+            <a:r>
+              <a:rPr lang="en-AU" dirty="0"/>
+              <a:t>Upload a picture of your dog </a:t>
+            </a:r>
+          </a:p>
+        </p:txBody>
+      </p:sp>
+      <p:sp>
+        <p:nvSpPr>
+          <p:cNvPr id="6" name="TextBox 5">
+            <a:extLst>
+              <a:ext uri="{FF2B5EF4-FFF2-40B4-BE49-F238E27FC236}">
+                <a16:creationId xmlns:a16="http://schemas.microsoft.com/office/drawing/2014/main" id="{5E0E8027-45F7-7FB3-6784-4069081837BC}"/>
+              </a:ext>
+            </a:extLst>
+          </p:cNvPr>
+          <p:cNvSpPr txBox="1"/>
+          <p:nvPr/>
+        </p:nvSpPr>
+        <p:spPr>
+          <a:xfrm>
+            <a:off x="1842017" y="3847030"/>
+            <a:ext cx="1866123" cy="369332"/>
+          </a:xfrm>
+          <a:prstGeom prst="rect">
+            <a:avLst/>
+          </a:prstGeom>
+          <a:solidFill>
+            <a:schemeClr val="bg1">
+              <a:lumMod val="75000"/>
+            </a:schemeClr>
+          </a:solidFill>
+          <a:ln>
+            <a:solidFill>
+              <a:schemeClr val="tx1"/>
+            </a:solidFill>
+          </a:ln>
+        </p:spPr>
+        <p:txBody>
+          <a:bodyPr wrap="square" rtlCol="0">
+            <a:spAutoFit/>
+          </a:bodyPr>
+          <a:lstStyle/>
+          <a:p>
+            <a:pPr algn="ctr"/>
+            <a:r>
+              <a:rPr lang="en-AU" dirty="0"/>
+              <a:t>Upload</a:t>
+            </a:r>
+          </a:p>
+        </p:txBody>
+      </p:sp>
+      <p:sp>
+        <p:nvSpPr>
+          <p:cNvPr id="8" name="TextBox 7">
+            <a:extLst>
+              <a:ext uri="{FF2B5EF4-FFF2-40B4-BE49-F238E27FC236}">
+                <a16:creationId xmlns:a16="http://schemas.microsoft.com/office/drawing/2014/main" id="{6F30B08B-99AA-072E-0159-0DC34C9AD4D0}"/>
+              </a:ext>
+            </a:extLst>
+          </p:cNvPr>
+          <p:cNvSpPr txBox="1"/>
+          <p:nvPr/>
+        </p:nvSpPr>
+        <p:spPr>
+          <a:xfrm>
+            <a:off x="6096000" y="1649723"/>
+            <a:ext cx="5393094" cy="369332"/>
+          </a:xfrm>
+          <a:prstGeom prst="rect">
+            <a:avLst/>
+          </a:prstGeom>
+          <a:noFill/>
+        </p:spPr>
+        <p:txBody>
+          <a:bodyPr wrap="square" rtlCol="0">
+            <a:spAutoFit/>
+          </a:bodyPr>
+          <a:lstStyle/>
+          <a:p>
+            <a:r>
+              <a:rPr lang="en-AU" dirty="0"/>
+              <a:t>List of dog breed it could be and pictures </a:t>
+            </a:r>
+          </a:p>
+        </p:txBody>
+      </p:sp>
+      <p:sp>
+        <p:nvSpPr>
+          <p:cNvPr id="9" name="Rectangle 8">
+            <a:extLst>
+              <a:ext uri="{FF2B5EF4-FFF2-40B4-BE49-F238E27FC236}">
+                <a16:creationId xmlns:a16="http://schemas.microsoft.com/office/drawing/2014/main" id="{75B3A08A-DFD5-AB0D-3A6E-BDD2EDE05A24}"/>
+              </a:ext>
+            </a:extLst>
+          </p:cNvPr>
+          <p:cNvSpPr/>
+          <p:nvPr/>
+        </p:nvSpPr>
+        <p:spPr>
+          <a:xfrm>
+            <a:off x="6096000" y="2162755"/>
+            <a:ext cx="2245567" cy="1266245"/>
+          </a:xfrm>
+          <a:prstGeom prst="rect">
+            <a:avLst/>
+          </a:prstGeom>
+        </p:spPr>
+        <p:style>
+          <a:lnRef idx="2">
+            <a:schemeClr val="accent1">
+              <a:shade val="15000"/>
+            </a:schemeClr>
+          </a:lnRef>
+          <a:fillRef idx="1">
+            <a:schemeClr val="accent1"/>
+          </a:fillRef>
+          <a:effectRef idx="0">
+            <a:schemeClr val="accent1"/>
+          </a:effectRef>
+          <a:fontRef idx="minor">
+            <a:schemeClr val="lt1"/>
+          </a:fontRef>
+        </p:style>
+        <p:txBody>
+          <a:bodyPr rtlCol="0" anchor="ctr"/>
+          <a:lstStyle/>
+          <a:p>
+            <a:pPr algn="ctr"/>
+            <a:endParaRPr lang="en-AU"/>
+          </a:p>
+        </p:txBody>
+      </p:sp>
+      <p:sp>
+        <p:nvSpPr>
+          <p:cNvPr id="10" name="Rectangle 9">
+            <a:extLst>
+              <a:ext uri="{FF2B5EF4-FFF2-40B4-BE49-F238E27FC236}">
+                <a16:creationId xmlns:a16="http://schemas.microsoft.com/office/drawing/2014/main" id="{EF5E7264-E759-02BA-0FF0-74D71EEA9C00}"/>
+              </a:ext>
+            </a:extLst>
+          </p:cNvPr>
+          <p:cNvSpPr/>
+          <p:nvPr/>
+        </p:nvSpPr>
+        <p:spPr>
+          <a:xfrm>
+            <a:off x="6096000" y="4982646"/>
+            <a:ext cx="2245567" cy="1266245"/>
+          </a:xfrm>
+          <a:prstGeom prst="rect">
+            <a:avLst/>
+          </a:prstGeom>
+        </p:spPr>
+        <p:style>
+          <a:lnRef idx="2">
+            <a:schemeClr val="accent1">
+              <a:shade val="15000"/>
+            </a:schemeClr>
+          </a:lnRef>
+          <a:fillRef idx="1">
+            <a:schemeClr val="accent1"/>
+          </a:fillRef>
+          <a:effectRef idx="0">
+            <a:schemeClr val="accent1"/>
+          </a:effectRef>
+          <a:fontRef idx="minor">
+            <a:schemeClr val="lt1"/>
+          </a:fontRef>
+        </p:style>
+        <p:txBody>
+          <a:bodyPr rtlCol="0" anchor="ctr"/>
+          <a:lstStyle/>
+          <a:p>
+            <a:pPr algn="ctr"/>
+            <a:endParaRPr lang="en-AU"/>
+          </a:p>
+        </p:txBody>
+      </p:sp>
+      <p:sp>
+        <p:nvSpPr>
+          <p:cNvPr id="11" name="Rectangle 10">
+            <a:extLst>
+              <a:ext uri="{FF2B5EF4-FFF2-40B4-BE49-F238E27FC236}">
+                <a16:creationId xmlns:a16="http://schemas.microsoft.com/office/drawing/2014/main" id="{D556FCB9-E3D8-064A-31DF-472C144BC34F}"/>
+              </a:ext>
+            </a:extLst>
+          </p:cNvPr>
+          <p:cNvSpPr/>
+          <p:nvPr/>
+        </p:nvSpPr>
+        <p:spPr>
+          <a:xfrm rot="10800000">
+            <a:off x="6096000" y="3572701"/>
+            <a:ext cx="2245567" cy="1266245"/>
+          </a:xfrm>
+          <a:prstGeom prst="rect">
+            <a:avLst/>
+          </a:prstGeom>
+        </p:spPr>
+        <p:style>
+          <a:lnRef idx="2">
+            <a:schemeClr val="accent1">
+              <a:shade val="15000"/>
+            </a:schemeClr>
+          </a:lnRef>
+          <a:fillRef idx="1">
+            <a:schemeClr val="accent1"/>
+          </a:fillRef>
+          <a:effectRef idx="0">
+            <a:schemeClr val="accent1"/>
+          </a:effectRef>
+          <a:fontRef idx="minor">
+            <a:schemeClr val="lt1"/>
+          </a:fontRef>
+        </p:style>
+        <p:txBody>
+          <a:bodyPr rtlCol="0" anchor="ctr"/>
+          <a:lstStyle/>
+          <a:p>
+            <a:pPr algn="ctr"/>
+            <a:endParaRPr lang="en-AU"/>
+          </a:p>
+        </p:txBody>
+      </p:sp>
+      <p:sp>
+        <p:nvSpPr>
+          <p:cNvPr id="13" name="TextBox 12">
+            <a:extLst>
+              <a:ext uri="{FF2B5EF4-FFF2-40B4-BE49-F238E27FC236}">
+                <a16:creationId xmlns:a16="http://schemas.microsoft.com/office/drawing/2014/main" id="{ECDF0772-E0D5-0D7F-A185-4239059EBB4C}"/>
+              </a:ext>
+            </a:extLst>
+          </p:cNvPr>
+          <p:cNvSpPr txBox="1"/>
+          <p:nvPr/>
+        </p:nvSpPr>
+        <p:spPr>
+          <a:xfrm>
+            <a:off x="8792547" y="2598622"/>
+            <a:ext cx="2379306" cy="369332"/>
+          </a:xfrm>
+          <a:prstGeom prst="rect">
+            <a:avLst/>
+          </a:prstGeom>
+          <a:noFill/>
+        </p:spPr>
+        <p:txBody>
+          <a:bodyPr wrap="square" rtlCol="0">
+            <a:spAutoFit/>
+          </a:bodyPr>
+          <a:lstStyle/>
+          <a:p>
+            <a:r>
+              <a:rPr lang="en-AU" dirty="0"/>
+              <a:t>Info about dog 1 </a:t>
+            </a:r>
+          </a:p>
+        </p:txBody>
+      </p:sp>
+      <p:sp>
+        <p:nvSpPr>
+          <p:cNvPr id="17" name="TextBox 16">
+            <a:extLst>
+              <a:ext uri="{FF2B5EF4-FFF2-40B4-BE49-F238E27FC236}">
+                <a16:creationId xmlns:a16="http://schemas.microsoft.com/office/drawing/2014/main" id="{D1405C92-2B30-3BCF-1894-66214D2CC89E}"/>
+              </a:ext>
+            </a:extLst>
+          </p:cNvPr>
+          <p:cNvSpPr txBox="1"/>
+          <p:nvPr/>
+        </p:nvSpPr>
+        <p:spPr>
+          <a:xfrm>
+            <a:off x="8714790" y="4043792"/>
+            <a:ext cx="2379306" cy="369332"/>
+          </a:xfrm>
+          <a:prstGeom prst="rect">
+            <a:avLst/>
+          </a:prstGeom>
+          <a:noFill/>
+        </p:spPr>
+        <p:txBody>
+          <a:bodyPr wrap="square" rtlCol="0">
+            <a:spAutoFit/>
+          </a:bodyPr>
+          <a:lstStyle/>
+          <a:p>
+            <a:r>
+              <a:rPr lang="en-AU" dirty="0"/>
+              <a:t>Info about dog 2</a:t>
+            </a:r>
+          </a:p>
+        </p:txBody>
+      </p:sp>
+      <p:sp>
+        <p:nvSpPr>
+          <p:cNvPr id="18" name="TextBox 17">
+            <a:extLst>
+              <a:ext uri="{FF2B5EF4-FFF2-40B4-BE49-F238E27FC236}">
+                <a16:creationId xmlns:a16="http://schemas.microsoft.com/office/drawing/2014/main" id="{62162F5B-D3BF-43BE-0FF4-5B9E945B99CC}"/>
+              </a:ext>
+            </a:extLst>
+          </p:cNvPr>
+          <p:cNvSpPr txBox="1"/>
+          <p:nvPr/>
+        </p:nvSpPr>
+        <p:spPr>
+          <a:xfrm>
+            <a:off x="8792547" y="5431102"/>
+            <a:ext cx="2379306" cy="369332"/>
+          </a:xfrm>
+          <a:prstGeom prst="rect">
+            <a:avLst/>
+          </a:prstGeom>
+          <a:noFill/>
+        </p:spPr>
+        <p:txBody>
+          <a:bodyPr wrap="square" rtlCol="0">
+            <a:spAutoFit/>
+          </a:bodyPr>
+          <a:lstStyle/>
+          <a:p>
+            <a:r>
+              <a:rPr lang="en-AU" dirty="0"/>
+              <a:t>Info about dog 3 </a:t>
+            </a:r>
+          </a:p>
+        </p:txBody>
+      </p:sp>
+      <p:sp>
+        <p:nvSpPr>
+          <p:cNvPr id="19" name="TextBox 18">
+            <a:extLst>
+              <a:ext uri="{FF2B5EF4-FFF2-40B4-BE49-F238E27FC236}">
+                <a16:creationId xmlns:a16="http://schemas.microsoft.com/office/drawing/2014/main" id="{BBA8F3CC-34AE-8869-5025-9F077137249A}"/>
+              </a:ext>
+            </a:extLst>
+          </p:cNvPr>
+          <p:cNvSpPr txBox="1"/>
+          <p:nvPr/>
+        </p:nvSpPr>
+        <p:spPr>
+          <a:xfrm>
+            <a:off x="1138335" y="4739951"/>
+            <a:ext cx="3415004" cy="646331"/>
+          </a:xfrm>
+          <a:prstGeom prst="rect">
+            <a:avLst/>
+          </a:prstGeom>
+          <a:noFill/>
+        </p:spPr>
+        <p:txBody>
+          <a:bodyPr wrap="square" rtlCol="0">
+            <a:spAutoFit/>
+          </a:bodyPr>
+          <a:lstStyle/>
+          <a:p>
+            <a:r>
+              <a:rPr lang="en-AU" dirty="0"/>
+              <a:t>was this accurate? pop up? </a:t>
+            </a:r>
+          </a:p>
+          <a:p>
+            <a:r>
+              <a:rPr lang="en-AU" dirty="0"/>
+              <a:t>Yes/No try again </a:t>
+            </a:r>
+          </a:p>
+        </p:txBody>
+      </p:sp>
+    </p:spTree>
+    <p:extLst>
+      <p:ext uri="{BB962C8B-B14F-4D97-AF65-F5344CB8AC3E}">
+        <p14:creationId xmlns:p14="http://schemas.microsoft.com/office/powerpoint/2010/main" val="3813515164"/>
       </p:ext>
     </p:extLst>
   </p:cSld>

</xml_diff>